<commit_message>
Homework question 1 is complete :boom:
</commit_message>
<xml_diff>
--- a/Assignment 4/solutions/homework/homework.pptx
+++ b/Assignment 4/solutions/homework/homework.pptx
@@ -4,6 +4,9 @@
   <p:sldMasterIdLst>
     <p:sldMasterId id="2147483648" r:id="rId1"/>
   </p:sldMasterIdLst>
+  <p:notesMasterIdLst>
+    <p:notesMasterId r:id="rId10"/>
+  </p:notesMasterIdLst>
   <p:sldIdLst>
     <p:sldId id="256" r:id="rId2"/>
     <p:sldId id="257" r:id="rId3"/>
@@ -13,7 +16,6 @@
     <p:sldId id="261" r:id="rId7"/>
     <p:sldId id="262" r:id="rId8"/>
     <p:sldId id="264" r:id="rId9"/>
-    <p:sldId id="263" r:id="rId10"/>
   </p:sldIdLst>
   <p:sldSz cx="12192000" cy="6858000"/>
   <p:notesSz cx="6858000" cy="9144000"/>
@@ -120,6 +122,1391 @@
 </p:presentation>
 </file>
 
+<file path=ppt/notesMasters/notesMaster1.xml><?xml version="1.0" encoding="utf-8"?>
+<p:notesMaster xmlns:a="http://schemas.openxmlformats.org/drawingml/2006/main" xmlns:r="http://schemas.openxmlformats.org/officeDocument/2006/relationships" xmlns:p="http://schemas.openxmlformats.org/presentationml/2006/main">
+  <p:cSld>
+    <p:bg>
+      <p:bgRef idx="1001">
+        <a:schemeClr val="bg1"/>
+      </p:bgRef>
+    </p:bg>
+    <p:spTree>
+      <p:nvGrpSpPr>
+        <p:cNvPr id="1" name=""/>
+        <p:cNvGrpSpPr/>
+        <p:nvPr/>
+      </p:nvGrpSpPr>
+      <p:grpSpPr>
+        <a:xfrm>
+          <a:off x="0" y="0"/>
+          <a:ext cx="0" cy="0"/>
+          <a:chOff x="0" y="0"/>
+          <a:chExt cx="0" cy="0"/>
+        </a:xfrm>
+      </p:grpSpPr>
+      <p:sp>
+        <p:nvSpPr>
+          <p:cNvPr id="2" name="מציין מיקום של כותרת עליונה 1"/>
+          <p:cNvSpPr>
+            <a:spLocks noGrp="1"/>
+          </p:cNvSpPr>
+          <p:nvPr>
+            <p:ph type="hdr" sz="quarter"/>
+          </p:nvPr>
+        </p:nvSpPr>
+        <p:spPr>
+          <a:xfrm>
+            <a:off x="3886200" y="0"/>
+            <a:ext cx="2971800" cy="458788"/>
+          </a:xfrm>
+          <a:prstGeom prst="rect">
+            <a:avLst/>
+          </a:prstGeom>
+        </p:spPr>
+        <p:txBody>
+          <a:bodyPr vert="horz" lIns="91440" tIns="45720" rIns="91440" bIns="45720" rtlCol="1"/>
+          <a:lstStyle>
+            <a:lvl1pPr algn="l">
+              <a:defRPr sz="1200"/>
+            </a:lvl1pPr>
+          </a:lstStyle>
+          <a:p>
+            <a:endParaRPr lang="en-IL"/>
+          </a:p>
+        </p:txBody>
+      </p:sp>
+      <p:sp>
+        <p:nvSpPr>
+          <p:cNvPr id="3" name="מציין מיקום של תאריך 2"/>
+          <p:cNvSpPr>
+            <a:spLocks noGrp="1"/>
+          </p:cNvSpPr>
+          <p:nvPr>
+            <p:ph type="dt" idx="1"/>
+          </p:nvPr>
+        </p:nvSpPr>
+        <p:spPr>
+          <a:xfrm>
+            <a:off x="1588" y="0"/>
+            <a:ext cx="2971800" cy="458788"/>
+          </a:xfrm>
+          <a:prstGeom prst="rect">
+            <a:avLst/>
+          </a:prstGeom>
+        </p:spPr>
+        <p:txBody>
+          <a:bodyPr vert="horz" lIns="91440" tIns="45720" rIns="91440" bIns="45720" rtlCol="1"/>
+          <a:lstStyle>
+            <a:lvl1pPr algn="r">
+              <a:defRPr sz="1200"/>
+            </a:lvl1pPr>
+          </a:lstStyle>
+          <a:p>
+            <a:fld id="{DDADA268-4939-4A23-8455-C2AF7F80E1F7}" type="datetimeFigureOut">
+              <a:rPr lang="en-IL" smtClean="0"/>
+              <a:t>20/04/2020</a:t>
+            </a:fld>
+            <a:endParaRPr lang="en-IL"/>
+          </a:p>
+        </p:txBody>
+      </p:sp>
+      <p:sp>
+        <p:nvSpPr>
+          <p:cNvPr id="4" name="מציין מיקום של תמונת שקופית 3"/>
+          <p:cNvSpPr>
+            <a:spLocks noGrp="1" noRot="1" noChangeAspect="1"/>
+          </p:cNvSpPr>
+          <p:nvPr>
+            <p:ph type="sldImg" idx="2"/>
+          </p:nvPr>
+        </p:nvSpPr>
+        <p:spPr>
+          <a:xfrm>
+            <a:off x="685800" y="1143000"/>
+            <a:ext cx="5486400" cy="3086100"/>
+          </a:xfrm>
+          <a:prstGeom prst="rect">
+            <a:avLst/>
+          </a:prstGeom>
+          <a:noFill/>
+          <a:ln w="12700">
+            <a:solidFill>
+              <a:prstClr val="black"/>
+            </a:solidFill>
+          </a:ln>
+        </p:spPr>
+        <p:txBody>
+          <a:bodyPr vert="horz" lIns="91440" tIns="45720" rIns="91440" bIns="45720" rtlCol="1" anchor="ctr"/>
+          <a:lstStyle/>
+          <a:p>
+            <a:endParaRPr lang="en-IL"/>
+          </a:p>
+        </p:txBody>
+      </p:sp>
+      <p:sp>
+        <p:nvSpPr>
+          <p:cNvPr id="5" name="מציין מיקום של הערות 4"/>
+          <p:cNvSpPr>
+            <a:spLocks noGrp="1"/>
+          </p:cNvSpPr>
+          <p:nvPr>
+            <p:ph type="body" sz="quarter" idx="3"/>
+          </p:nvPr>
+        </p:nvSpPr>
+        <p:spPr>
+          <a:xfrm>
+            <a:off x="685800" y="4400550"/>
+            <a:ext cx="5486400" cy="3600450"/>
+          </a:xfrm>
+          <a:prstGeom prst="rect">
+            <a:avLst/>
+          </a:prstGeom>
+        </p:spPr>
+        <p:txBody>
+          <a:bodyPr vert="horz" lIns="91440" tIns="45720" rIns="91440" bIns="45720" rtlCol="1"/>
+          <a:lstStyle/>
+          <a:p>
+            <a:pPr lvl="0"/>
+            <a:r>
+              <a:rPr lang="he-IL"/>
+              <a:t>לחץ כדי לערוך סגנונות טקסט של תבנית בסיס</a:t>
+            </a:r>
+          </a:p>
+          <a:p>
+            <a:pPr lvl="1"/>
+            <a:r>
+              <a:rPr lang="he-IL"/>
+              <a:t>רמה שנייה</a:t>
+            </a:r>
+          </a:p>
+          <a:p>
+            <a:pPr lvl="2"/>
+            <a:r>
+              <a:rPr lang="he-IL"/>
+              <a:t>רמה שלישית</a:t>
+            </a:r>
+          </a:p>
+          <a:p>
+            <a:pPr lvl="3"/>
+            <a:r>
+              <a:rPr lang="he-IL"/>
+              <a:t>רמה רביעית</a:t>
+            </a:r>
+          </a:p>
+          <a:p>
+            <a:pPr lvl="4"/>
+            <a:r>
+              <a:rPr lang="he-IL"/>
+              <a:t>רמה חמישית</a:t>
+            </a:r>
+            <a:endParaRPr lang="en-IL"/>
+          </a:p>
+        </p:txBody>
+      </p:sp>
+      <p:sp>
+        <p:nvSpPr>
+          <p:cNvPr id="6" name="מציין מיקום של כותרת תחתונה 5"/>
+          <p:cNvSpPr>
+            <a:spLocks noGrp="1"/>
+          </p:cNvSpPr>
+          <p:nvPr>
+            <p:ph type="ftr" sz="quarter" idx="4"/>
+          </p:nvPr>
+        </p:nvSpPr>
+        <p:spPr>
+          <a:xfrm>
+            <a:off x="3886200" y="8685213"/>
+            <a:ext cx="2971800" cy="458787"/>
+          </a:xfrm>
+          <a:prstGeom prst="rect">
+            <a:avLst/>
+          </a:prstGeom>
+        </p:spPr>
+        <p:txBody>
+          <a:bodyPr vert="horz" lIns="91440" tIns="45720" rIns="91440" bIns="45720" rtlCol="1" anchor="b"/>
+          <a:lstStyle>
+            <a:lvl1pPr algn="l">
+              <a:defRPr sz="1200"/>
+            </a:lvl1pPr>
+          </a:lstStyle>
+          <a:p>
+            <a:endParaRPr lang="en-IL"/>
+          </a:p>
+        </p:txBody>
+      </p:sp>
+      <p:sp>
+        <p:nvSpPr>
+          <p:cNvPr id="7" name="מציין מיקום של מספר שקופית 6"/>
+          <p:cNvSpPr>
+            <a:spLocks noGrp="1"/>
+          </p:cNvSpPr>
+          <p:nvPr>
+            <p:ph type="sldNum" sz="quarter" idx="5"/>
+          </p:nvPr>
+        </p:nvSpPr>
+        <p:spPr>
+          <a:xfrm>
+            <a:off x="1588" y="8685213"/>
+            <a:ext cx="2971800" cy="458787"/>
+          </a:xfrm>
+          <a:prstGeom prst="rect">
+            <a:avLst/>
+          </a:prstGeom>
+        </p:spPr>
+        <p:txBody>
+          <a:bodyPr vert="horz" lIns="91440" tIns="45720" rIns="91440" bIns="45720" rtlCol="1" anchor="b"/>
+          <a:lstStyle>
+            <a:lvl1pPr algn="r">
+              <a:defRPr sz="1200"/>
+            </a:lvl1pPr>
+          </a:lstStyle>
+          <a:p>
+            <a:fld id="{5224633E-AE6C-45DA-B5C2-DE4EC2DC249C}" type="slidenum">
+              <a:rPr lang="en-IL" smtClean="0"/>
+              <a:t>‹#›</a:t>
+            </a:fld>
+            <a:endParaRPr lang="en-IL"/>
+          </a:p>
+        </p:txBody>
+      </p:sp>
+    </p:spTree>
+    <p:extLst>
+      <p:ext uri="{BB962C8B-B14F-4D97-AF65-F5344CB8AC3E}">
+        <p14:creationId xmlns:p14="http://schemas.microsoft.com/office/powerpoint/2010/main" val="3725149204"/>
+      </p:ext>
+    </p:extLst>
+  </p:cSld>
+  <p:clrMap bg1="lt1" tx1="dk1" bg2="lt2" tx2="dk2" accent1="accent1" accent2="accent2" accent3="accent3" accent4="accent4" accent5="accent5" accent6="accent6" hlink="hlink" folHlink="folHlink"/>
+  <p:notesStyle>
+    <a:lvl1pPr marL="0" algn="r" defTabSz="914400" rtl="1" eaLnBrk="1" latinLnBrk="0" hangingPunct="1">
+      <a:defRPr sz="1200" kern="1200">
+        <a:solidFill>
+          <a:schemeClr val="tx1"/>
+        </a:solidFill>
+        <a:latin typeface="+mn-lt"/>
+        <a:ea typeface="+mn-ea"/>
+        <a:cs typeface="+mn-cs"/>
+      </a:defRPr>
+    </a:lvl1pPr>
+    <a:lvl2pPr marL="457200" algn="r" defTabSz="914400" rtl="1" eaLnBrk="1" latinLnBrk="0" hangingPunct="1">
+      <a:defRPr sz="1200" kern="1200">
+        <a:solidFill>
+          <a:schemeClr val="tx1"/>
+        </a:solidFill>
+        <a:latin typeface="+mn-lt"/>
+        <a:ea typeface="+mn-ea"/>
+        <a:cs typeface="+mn-cs"/>
+      </a:defRPr>
+    </a:lvl2pPr>
+    <a:lvl3pPr marL="914400" algn="r" defTabSz="914400" rtl="1" eaLnBrk="1" latinLnBrk="0" hangingPunct="1">
+      <a:defRPr sz="1200" kern="1200">
+        <a:solidFill>
+          <a:schemeClr val="tx1"/>
+        </a:solidFill>
+        <a:latin typeface="+mn-lt"/>
+        <a:ea typeface="+mn-ea"/>
+        <a:cs typeface="+mn-cs"/>
+      </a:defRPr>
+    </a:lvl3pPr>
+    <a:lvl4pPr marL="1371600" algn="r" defTabSz="914400" rtl="1" eaLnBrk="1" latinLnBrk="0" hangingPunct="1">
+      <a:defRPr sz="1200" kern="1200">
+        <a:solidFill>
+          <a:schemeClr val="tx1"/>
+        </a:solidFill>
+        <a:latin typeface="+mn-lt"/>
+        <a:ea typeface="+mn-ea"/>
+        <a:cs typeface="+mn-cs"/>
+      </a:defRPr>
+    </a:lvl4pPr>
+    <a:lvl5pPr marL="1828800" algn="r" defTabSz="914400" rtl="1" eaLnBrk="1" latinLnBrk="0" hangingPunct="1">
+      <a:defRPr sz="1200" kern="1200">
+        <a:solidFill>
+          <a:schemeClr val="tx1"/>
+        </a:solidFill>
+        <a:latin typeface="+mn-lt"/>
+        <a:ea typeface="+mn-ea"/>
+        <a:cs typeface="+mn-cs"/>
+      </a:defRPr>
+    </a:lvl5pPr>
+    <a:lvl6pPr marL="2286000" algn="r" defTabSz="914400" rtl="1" eaLnBrk="1" latinLnBrk="0" hangingPunct="1">
+      <a:defRPr sz="1200" kern="1200">
+        <a:solidFill>
+          <a:schemeClr val="tx1"/>
+        </a:solidFill>
+        <a:latin typeface="+mn-lt"/>
+        <a:ea typeface="+mn-ea"/>
+        <a:cs typeface="+mn-cs"/>
+      </a:defRPr>
+    </a:lvl6pPr>
+    <a:lvl7pPr marL="2743200" algn="r" defTabSz="914400" rtl="1" eaLnBrk="1" latinLnBrk="0" hangingPunct="1">
+      <a:defRPr sz="1200" kern="1200">
+        <a:solidFill>
+          <a:schemeClr val="tx1"/>
+        </a:solidFill>
+        <a:latin typeface="+mn-lt"/>
+        <a:ea typeface="+mn-ea"/>
+        <a:cs typeface="+mn-cs"/>
+      </a:defRPr>
+    </a:lvl7pPr>
+    <a:lvl8pPr marL="3200400" algn="r" defTabSz="914400" rtl="1" eaLnBrk="1" latinLnBrk="0" hangingPunct="1">
+      <a:defRPr sz="1200" kern="1200">
+        <a:solidFill>
+          <a:schemeClr val="tx1"/>
+        </a:solidFill>
+        <a:latin typeface="+mn-lt"/>
+        <a:ea typeface="+mn-ea"/>
+        <a:cs typeface="+mn-cs"/>
+      </a:defRPr>
+    </a:lvl8pPr>
+    <a:lvl9pPr marL="3657600" algn="r" defTabSz="914400" rtl="1" eaLnBrk="1" latinLnBrk="0" hangingPunct="1">
+      <a:defRPr sz="1200" kern="1200">
+        <a:solidFill>
+          <a:schemeClr val="tx1"/>
+        </a:solidFill>
+        <a:latin typeface="+mn-lt"/>
+        <a:ea typeface="+mn-ea"/>
+        <a:cs typeface="+mn-cs"/>
+      </a:defRPr>
+    </a:lvl9pPr>
+  </p:notesStyle>
+</p:notesMaster>
+</file>
+
+<file path=ppt/notesSlides/notesSlide1.xml><?xml version="1.0" encoding="utf-8"?>
+<p:notes xmlns:a="http://schemas.openxmlformats.org/drawingml/2006/main" xmlns:r="http://schemas.openxmlformats.org/officeDocument/2006/relationships" xmlns:p="http://schemas.openxmlformats.org/presentationml/2006/main">
+  <p:cSld>
+    <p:spTree>
+      <p:nvGrpSpPr>
+        <p:cNvPr id="1" name=""/>
+        <p:cNvGrpSpPr/>
+        <p:nvPr/>
+      </p:nvGrpSpPr>
+      <p:grpSpPr>
+        <a:xfrm>
+          <a:off x="0" y="0"/>
+          <a:ext cx="0" cy="0"/>
+          <a:chOff x="0" y="0"/>
+          <a:chExt cx="0" cy="0"/>
+        </a:xfrm>
+      </p:grpSpPr>
+      <p:sp>
+        <p:nvSpPr>
+          <p:cNvPr id="2" name="מציין מיקום של תמונת שקופית 1"/>
+          <p:cNvSpPr>
+            <a:spLocks noGrp="1" noRot="1" noChangeAspect="1"/>
+          </p:cNvSpPr>
+          <p:nvPr>
+            <p:ph type="sldImg"/>
+          </p:nvPr>
+        </p:nvSpPr>
+        <p:spPr/>
+      </p:sp>
+      <p:sp>
+        <p:nvSpPr>
+          <p:cNvPr id="3" name="מציין מיקום של הערות 2"/>
+          <p:cNvSpPr>
+            <a:spLocks noGrp="1"/>
+          </p:cNvSpPr>
+          <p:nvPr>
+            <p:ph type="body" idx="1"/>
+          </p:nvPr>
+        </p:nvSpPr>
+        <p:spPr/>
+        <p:txBody>
+          <a:bodyPr/>
+          <a:lstStyle/>
+          <a:p>
+            <a:r>
+              <a:rPr lang="he-IL" dirty="0"/>
+              <a:t>במשחק זה יש כמה סוגים של עצמים</a:t>
+            </a:r>
+          </a:p>
+          <a:p>
+            <a:r>
+              <a:rPr lang="he-IL" dirty="0"/>
+              <a:t>בחלון המשחק יש </a:t>
+            </a:r>
+          </a:p>
+          <a:p>
+            <a:r>
+              <a:rPr lang="he-IL" dirty="0"/>
+              <a:t>כורה הזהב – השחקן עצמו בעזרתו ניתן לאסוף את האוצרות , ההתנהגות שלו זה לשלוח את הגלגלת בכדי לאסוף את הזהב ולצבור כמה שיותר כסף</a:t>
+            </a:r>
+          </a:p>
+          <a:p>
+            <a:r>
+              <a:rPr lang="he-IL" dirty="0"/>
+              <a:t>אוצרות – יש כמה סוגים של אוצרות כגון זהב , יהלומים , אבנים וכו' , כל אוצר יש לו סכום ערך שונה.</a:t>
+            </a:r>
+          </a:p>
+          <a:p>
+            <a:r>
+              <a:rPr lang="he-IL" dirty="0"/>
+              <a:t>חפרפרות – החפרפרות רצות במסך , ערכם הוא נמוך לכן הם מפריעות לשחקן להשיג סכום כסף גבוה , אך לפעמים יש חפרפרת עם יהלום כך שערך החפרפרת גבוה ולכן שווה לנסות לתפוס אותה</a:t>
+            </a:r>
+          </a:p>
+          <a:p>
+            <a:endParaRPr lang="he-IL" dirty="0"/>
+          </a:p>
+          <a:p>
+            <a:r>
+              <a:rPr lang="he-IL" dirty="0"/>
+              <a:t>בחנות –</a:t>
+            </a:r>
+          </a:p>
+          <a:p>
+            <a:r>
+              <a:rPr lang="he-IL" dirty="0"/>
+              <a:t>בחנות יש מגוון של עצמים </a:t>
+            </a:r>
+          </a:p>
+          <a:p>
+            <a:r>
+              <a:rPr lang="he-IL" dirty="0"/>
+              <a:t>פצצה – מפוצצת את האוצר ע"י החלטה של השחקן , משמשת בעיקר בכדי להיפטר מאבנים גדולות וכבדות.</a:t>
+            </a:r>
+          </a:p>
+          <a:p>
+            <a:r>
+              <a:rPr lang="he-IL" dirty="0"/>
+              <a:t>ספר אבנים – מעלה את הערך של האבנים </a:t>
+            </a:r>
+          </a:p>
+          <a:p>
+            <a:r>
+              <a:rPr lang="he-IL" dirty="0"/>
+              <a:t>מבריק יהלומים – בשלב הבא היהלומים יהיו שווים יותר כסף </a:t>
+            </a:r>
+          </a:p>
+          <a:p>
+            <a:r>
+              <a:rPr lang="he-IL" dirty="0"/>
+              <a:t>משקה חוזק – גורם לכורה לגלול את העצמים מהר יותר</a:t>
+            </a:r>
+          </a:p>
+          <a:p>
+            <a:r>
+              <a:rPr lang="he-IL" dirty="0"/>
+              <a:t>תלתן – מגדיל את הסיכוי לתפוס עצמים בשלב הבא</a:t>
+            </a:r>
+            <a:endParaRPr lang="en-IL" dirty="0"/>
+          </a:p>
+        </p:txBody>
+      </p:sp>
+      <p:sp>
+        <p:nvSpPr>
+          <p:cNvPr id="4" name="מציין מיקום של מספר שקופית 3"/>
+          <p:cNvSpPr>
+            <a:spLocks noGrp="1"/>
+          </p:cNvSpPr>
+          <p:nvPr>
+            <p:ph type="sldNum" sz="quarter" idx="5"/>
+          </p:nvPr>
+        </p:nvSpPr>
+        <p:spPr/>
+        <p:txBody>
+          <a:bodyPr/>
+          <a:lstStyle/>
+          <a:p>
+            <a:fld id="{5224633E-AE6C-45DA-B5C2-DE4EC2DC249C}" type="slidenum">
+              <a:rPr lang="en-IL" smtClean="0"/>
+              <a:t>2</a:t>
+            </a:fld>
+            <a:endParaRPr lang="en-IL"/>
+          </a:p>
+        </p:txBody>
+      </p:sp>
+    </p:spTree>
+    <p:extLst>
+      <p:ext uri="{BB962C8B-B14F-4D97-AF65-F5344CB8AC3E}">
+        <p14:creationId xmlns:p14="http://schemas.microsoft.com/office/powerpoint/2010/main" val="4156391268"/>
+      </p:ext>
+    </p:extLst>
+  </p:cSld>
+  <p:clrMapOvr>
+    <a:masterClrMapping/>
+  </p:clrMapOvr>
+</p:notes>
+</file>
+
+<file path=ppt/notesSlides/notesSlide2.xml><?xml version="1.0" encoding="utf-8"?>
+<p:notes xmlns:a="http://schemas.openxmlformats.org/drawingml/2006/main" xmlns:r="http://schemas.openxmlformats.org/officeDocument/2006/relationships" xmlns:p="http://schemas.openxmlformats.org/presentationml/2006/main">
+  <p:cSld>
+    <p:spTree>
+      <p:nvGrpSpPr>
+        <p:cNvPr id="1" name=""/>
+        <p:cNvGrpSpPr/>
+        <p:nvPr/>
+      </p:nvGrpSpPr>
+      <p:grpSpPr>
+        <a:xfrm>
+          <a:off x="0" y="0"/>
+          <a:ext cx="0" cy="0"/>
+          <a:chOff x="0" y="0"/>
+          <a:chExt cx="0" cy="0"/>
+        </a:xfrm>
+      </p:grpSpPr>
+      <p:sp>
+        <p:nvSpPr>
+          <p:cNvPr id="2" name="מציין מיקום של תמונת שקופית 1"/>
+          <p:cNvSpPr>
+            <a:spLocks noGrp="1" noRot="1" noChangeAspect="1"/>
+          </p:cNvSpPr>
+          <p:nvPr>
+            <p:ph type="sldImg"/>
+          </p:nvPr>
+        </p:nvSpPr>
+        <p:spPr/>
+      </p:sp>
+      <p:sp>
+        <p:nvSpPr>
+          <p:cNvPr id="3" name="מציין מיקום של הערות 2"/>
+          <p:cNvSpPr>
+            <a:spLocks noGrp="1"/>
+          </p:cNvSpPr>
+          <p:nvPr>
+            <p:ph type="body" idx="1"/>
+          </p:nvPr>
+        </p:nvSpPr>
+        <p:spPr/>
+        <p:txBody>
+          <a:bodyPr/>
+          <a:lstStyle/>
+          <a:p>
+            <a:pPr indent="-228600" algn="r">
+              <a:buFont typeface="Arial" panose="020B0604020202020204" pitchFamily="34" charset="0"/>
+              <a:buChar char="•"/>
+            </a:pPr>
+            <a:r>
+              <a:rPr lang="he-IL" sz="2000" dirty="0"/>
+              <a:t>במשחק זה לא קיים עצם מספרי אך יש כמה עצמים שיש לכם ערכים שונים</a:t>
+            </a:r>
+          </a:p>
+          <a:p>
+            <a:pPr lvl="2" indent="-228600">
+              <a:buFont typeface="Arial" panose="020B0604020202020204" pitchFamily="34" charset="0"/>
+              <a:buChar char="•"/>
+            </a:pPr>
+            <a:r>
+              <a:rPr lang="he-IL" sz="1600" dirty="0"/>
+              <a:t>יהלומים – ערך הכי גבוה במשחק</a:t>
+            </a:r>
+          </a:p>
+          <a:p>
+            <a:pPr lvl="2" indent="-228600">
+              <a:buFont typeface="Arial" panose="020B0604020202020204" pitchFamily="34" charset="0"/>
+              <a:buChar char="•"/>
+            </a:pPr>
+            <a:r>
+              <a:rPr lang="he-IL" sz="1600" dirty="0"/>
+              <a:t>זהב – יש כמה גדלים של זהב וכל גודל ערך שונה</a:t>
+            </a:r>
+          </a:p>
+          <a:p>
+            <a:pPr lvl="2" indent="-228600">
+              <a:buFont typeface="Arial" panose="020B0604020202020204" pitchFamily="34" charset="0"/>
+              <a:buChar char="•"/>
+            </a:pPr>
+            <a:r>
+              <a:rPr lang="he-IL" sz="1600" dirty="0"/>
+              <a:t>בחנות ניתן לקנות אביזרים שיעזרו לעבור את השלב הבא , והמחיר שלהם נבחר לפי הסכום שהשחקן הצליח להשיג לעומת הסכום שיהיה עליו להשיג בשלב הבא</a:t>
+            </a:r>
+          </a:p>
+          <a:p>
+            <a:pPr lvl="2" indent="-228600">
+              <a:buFont typeface="Arial" panose="020B0604020202020204" pitchFamily="34" charset="0"/>
+              <a:buChar char="•"/>
+            </a:pPr>
+            <a:r>
+              <a:rPr lang="he-IL" sz="1600" dirty="0"/>
+              <a:t>חפרפרת – הסכום הכי נמוך במשחק , אך ישנה אפשרות של חפרפרת עם יהלום</a:t>
+            </a:r>
+          </a:p>
+          <a:p>
+            <a:pPr marL="685800" lvl="2"/>
+            <a:endParaRPr lang="he-IL" sz="1600" dirty="0"/>
+          </a:p>
+          <a:p>
+            <a:pPr marL="685800" lvl="2"/>
+            <a:r>
+              <a:rPr lang="he-IL" sz="1600" dirty="0"/>
+              <a:t>כל הדוגמאות המפורטות כאן משפיעות על החלטות במשחק , כיוון שעל השחקן להחליט מה הוא רוצה לאסוף לפני מה , ובנוסף איך הוא קונה בחנות ועדיין נשאר לו מספיק כסף בכדי לעבור את השלב הבא</a:t>
+            </a:r>
+          </a:p>
+        </p:txBody>
+      </p:sp>
+      <p:sp>
+        <p:nvSpPr>
+          <p:cNvPr id="4" name="מציין מיקום של מספר שקופית 3"/>
+          <p:cNvSpPr>
+            <a:spLocks noGrp="1"/>
+          </p:cNvSpPr>
+          <p:nvPr>
+            <p:ph type="sldNum" sz="quarter" idx="5"/>
+          </p:nvPr>
+        </p:nvSpPr>
+        <p:spPr/>
+        <p:txBody>
+          <a:bodyPr/>
+          <a:lstStyle/>
+          <a:p>
+            <a:fld id="{5224633E-AE6C-45DA-B5C2-DE4EC2DC249C}" type="slidenum">
+              <a:rPr lang="en-IL" smtClean="0"/>
+              <a:t>3</a:t>
+            </a:fld>
+            <a:endParaRPr lang="en-IL"/>
+          </a:p>
+        </p:txBody>
+      </p:sp>
+    </p:spTree>
+    <p:extLst>
+      <p:ext uri="{BB962C8B-B14F-4D97-AF65-F5344CB8AC3E}">
+        <p14:creationId xmlns:p14="http://schemas.microsoft.com/office/powerpoint/2010/main" val="3175453569"/>
+      </p:ext>
+    </p:extLst>
+  </p:cSld>
+  <p:clrMapOvr>
+    <a:masterClrMapping/>
+  </p:clrMapOvr>
+</p:notes>
+</file>
+
+<file path=ppt/notesSlides/notesSlide3.xml><?xml version="1.0" encoding="utf-8"?>
+<p:notes xmlns:a="http://schemas.openxmlformats.org/drawingml/2006/main" xmlns:r="http://schemas.openxmlformats.org/officeDocument/2006/relationships" xmlns:p="http://schemas.openxmlformats.org/presentationml/2006/main">
+  <p:cSld>
+    <p:spTree>
+      <p:nvGrpSpPr>
+        <p:cNvPr id="1" name=""/>
+        <p:cNvGrpSpPr/>
+        <p:nvPr/>
+      </p:nvGrpSpPr>
+      <p:grpSpPr>
+        <a:xfrm>
+          <a:off x="0" y="0"/>
+          <a:ext cx="0" cy="0"/>
+          <a:chOff x="0" y="0"/>
+          <a:chExt cx="0" cy="0"/>
+        </a:xfrm>
+      </p:grpSpPr>
+      <p:sp>
+        <p:nvSpPr>
+          <p:cNvPr id="2" name="מציין מיקום של תמונת שקופית 1"/>
+          <p:cNvSpPr>
+            <a:spLocks noGrp="1" noRot="1" noChangeAspect="1"/>
+          </p:cNvSpPr>
+          <p:nvPr>
+            <p:ph type="sldImg"/>
+          </p:nvPr>
+        </p:nvSpPr>
+        <p:spPr/>
+      </p:sp>
+      <p:sp>
+        <p:nvSpPr>
+          <p:cNvPr id="3" name="מציין מיקום של הערות 2"/>
+          <p:cNvSpPr>
+            <a:spLocks noGrp="1"/>
+          </p:cNvSpPr>
+          <p:nvPr>
+            <p:ph type="body" idx="1"/>
+          </p:nvPr>
+        </p:nvSpPr>
+        <p:spPr/>
+        <p:txBody>
+          <a:bodyPr/>
+          <a:lstStyle/>
+          <a:p>
+            <a:pPr indent="-228600" algn="r">
+              <a:buFont typeface="Arial" panose="020B0604020202020204" pitchFamily="34" charset="0"/>
+              <a:buChar char="•"/>
+            </a:pPr>
+            <a:r>
+              <a:rPr lang="he-IL" sz="2000" dirty="0"/>
+              <a:t>לנסות לאסוף קודם כל את הזהב שנמצא הכי נגיש ורק לאחר מכן את שאר הזהב המרוחק</a:t>
+            </a:r>
+          </a:p>
+          <a:p>
+            <a:pPr algn="r"/>
+            <a:r>
+              <a:rPr lang="he-IL" sz="2000" dirty="0"/>
+              <a:t>	</a:t>
+            </a:r>
+            <a:r>
+              <a:rPr lang="he-IL" dirty="0">
+                <a:solidFill>
+                  <a:schemeClr val="accent4">
+                    <a:lumMod val="40000"/>
+                    <a:lumOff val="60000"/>
+                  </a:schemeClr>
+                </a:solidFill>
+              </a:rPr>
+              <a:t>כיוון שלפעמים הזמן לא מספיק בכדי לאסוף את כל האוצרות לכן בשביל לא להיפסל בשלב התחלנו איתם</a:t>
+            </a:r>
+          </a:p>
+          <a:p>
+            <a:pPr indent="-228600" algn="r">
+              <a:buFont typeface="Arial" panose="020B0604020202020204" pitchFamily="34" charset="0"/>
+              <a:buChar char="•"/>
+            </a:pPr>
+            <a:r>
+              <a:rPr lang="he-IL" sz="2000" dirty="0"/>
+              <a:t>לאסוף את אבני הזהב או היהלומים שהערך שלהם הוא הכי גדול ורק לאחר מכן את שאר הזהב</a:t>
+            </a:r>
+          </a:p>
+          <a:p>
+            <a:pPr algn="r"/>
+            <a:r>
+              <a:rPr lang="he-IL" dirty="0">
+                <a:solidFill>
+                  <a:schemeClr val="accent4">
+                    <a:lumMod val="40000"/>
+                    <a:lumOff val="60000"/>
+                  </a:schemeClr>
+                </a:solidFill>
+              </a:rPr>
+              <a:t>	רוב המשחקים האוצרות שהכי קרובים הם אבנים לכן בכדי להגיע לסכום גובה עדיף לבחור בהם</a:t>
+            </a:r>
+          </a:p>
+          <a:p>
+            <a:pPr indent="-228600" algn="r">
+              <a:buFont typeface="Arial" panose="020B0604020202020204" pitchFamily="34" charset="0"/>
+              <a:buChar char="•"/>
+            </a:pPr>
+            <a:r>
+              <a:rPr lang="he-IL" sz="2000" dirty="0"/>
+              <a:t>לאסוף את השקי הפתעה כיוון שיכול להיות שנקבל כוח בכדי לאסוף מהר יותר</a:t>
+            </a:r>
+          </a:p>
+          <a:p>
+            <a:pPr marL="228600" lvl="1"/>
+            <a:r>
+              <a:rPr lang="he-IL" sz="1800" dirty="0"/>
+              <a:t>	</a:t>
+            </a:r>
+            <a:r>
+              <a:rPr lang="he-IL" sz="1600" dirty="0">
+                <a:solidFill>
+                  <a:schemeClr val="accent4">
+                    <a:lumMod val="40000"/>
+                    <a:lumOff val="60000"/>
+                  </a:schemeClr>
+                </a:solidFill>
+              </a:rPr>
+              <a:t>קשה מאוד לקלוע בדיוק בזהב או ביהלומים לכן לפעמים מרימים אבן ומאבדים זמן יקר תמורת סכום כסף נמוך</a:t>
+            </a:r>
+          </a:p>
+          <a:p>
+            <a:pPr indent="-228600" algn="r">
+              <a:buFont typeface="Arial" panose="020B0604020202020204" pitchFamily="34" charset="0"/>
+              <a:buChar char="•"/>
+            </a:pPr>
+            <a:r>
+              <a:rPr lang="he-IL" sz="2000" dirty="0"/>
+              <a:t>כאשר מגיעים לשלב עם חפרפרות , קודם כל אסוף אותם ואח"כ להמשיך לשאר האוצרות</a:t>
+            </a:r>
+          </a:p>
+          <a:p>
+            <a:pPr algn="r"/>
+            <a:r>
+              <a:rPr lang="he-IL" dirty="0">
+                <a:solidFill>
+                  <a:schemeClr val="accent4">
+                    <a:lumMod val="40000"/>
+                    <a:lumOff val="60000"/>
+                  </a:schemeClr>
+                </a:solidFill>
+              </a:rPr>
+              <a:t>	החפרפרות זזות ומפריעות להתרכז במשחק לכן כאשר אוספים אותם המשחק יותר קל</a:t>
+            </a:r>
+          </a:p>
+          <a:p>
+            <a:pPr algn="r"/>
+            <a:endParaRPr lang="he-IL" dirty="0">
+              <a:solidFill>
+                <a:schemeClr val="accent4">
+                  <a:lumMod val="40000"/>
+                  <a:lumOff val="60000"/>
+                </a:schemeClr>
+              </a:solidFill>
+            </a:endParaRPr>
+          </a:p>
+          <a:p>
+            <a:pPr algn="r"/>
+            <a:r>
+              <a:rPr lang="he-IL" dirty="0">
+                <a:solidFill>
+                  <a:schemeClr val="accent4">
+                    <a:lumMod val="40000"/>
+                    <a:lumOff val="60000"/>
+                  </a:schemeClr>
+                </a:solidFill>
+              </a:rPr>
+              <a:t>את האסטרטגיות האלה גילינו תוך כדי משחק , כמובן שבמהלך משחק תמיד השתמשנו בכמה אסטרטגיות יחד.</a:t>
+            </a:r>
+            <a:endParaRPr lang="en-US" dirty="0">
+              <a:solidFill>
+                <a:schemeClr val="accent4">
+                  <a:lumMod val="40000"/>
+                  <a:lumOff val="60000"/>
+                </a:schemeClr>
+              </a:solidFill>
+            </a:endParaRPr>
+          </a:p>
+          <a:p>
+            <a:endParaRPr lang="en-IL" dirty="0"/>
+          </a:p>
+        </p:txBody>
+      </p:sp>
+      <p:sp>
+        <p:nvSpPr>
+          <p:cNvPr id="4" name="מציין מיקום של מספר שקופית 3"/>
+          <p:cNvSpPr>
+            <a:spLocks noGrp="1"/>
+          </p:cNvSpPr>
+          <p:nvPr>
+            <p:ph type="sldNum" sz="quarter" idx="5"/>
+          </p:nvPr>
+        </p:nvSpPr>
+        <p:spPr/>
+        <p:txBody>
+          <a:bodyPr/>
+          <a:lstStyle/>
+          <a:p>
+            <a:fld id="{5224633E-AE6C-45DA-B5C2-DE4EC2DC249C}" type="slidenum">
+              <a:rPr lang="en-IL" smtClean="0"/>
+              <a:t>4</a:t>
+            </a:fld>
+            <a:endParaRPr lang="en-IL"/>
+          </a:p>
+        </p:txBody>
+      </p:sp>
+    </p:spTree>
+    <p:extLst>
+      <p:ext uri="{BB962C8B-B14F-4D97-AF65-F5344CB8AC3E}">
+        <p14:creationId xmlns:p14="http://schemas.microsoft.com/office/powerpoint/2010/main" val="3395879438"/>
+      </p:ext>
+    </p:extLst>
+  </p:cSld>
+  <p:clrMapOvr>
+    <a:masterClrMapping/>
+  </p:clrMapOvr>
+</p:notes>
+</file>
+
+<file path=ppt/notesSlides/notesSlide4.xml><?xml version="1.0" encoding="utf-8"?>
+<p:notes xmlns:a="http://schemas.openxmlformats.org/drawingml/2006/main" xmlns:r="http://schemas.openxmlformats.org/officeDocument/2006/relationships" xmlns:p="http://schemas.openxmlformats.org/presentationml/2006/main">
+  <p:cSld>
+    <p:spTree>
+      <p:nvGrpSpPr>
+        <p:cNvPr id="1" name=""/>
+        <p:cNvGrpSpPr/>
+        <p:nvPr/>
+      </p:nvGrpSpPr>
+      <p:grpSpPr>
+        <a:xfrm>
+          <a:off x="0" y="0"/>
+          <a:ext cx="0" cy="0"/>
+          <a:chOff x="0" y="0"/>
+          <a:chExt cx="0" cy="0"/>
+        </a:xfrm>
+      </p:grpSpPr>
+      <p:sp>
+        <p:nvSpPr>
+          <p:cNvPr id="2" name="מציין מיקום של תמונת שקופית 1"/>
+          <p:cNvSpPr>
+            <a:spLocks noGrp="1" noRot="1" noChangeAspect="1"/>
+          </p:cNvSpPr>
+          <p:nvPr>
+            <p:ph type="sldImg"/>
+          </p:nvPr>
+        </p:nvSpPr>
+        <p:spPr/>
+      </p:sp>
+      <p:sp>
+        <p:nvSpPr>
+          <p:cNvPr id="3" name="מציין מיקום של הערות 2"/>
+          <p:cNvSpPr>
+            <a:spLocks noGrp="1"/>
+          </p:cNvSpPr>
+          <p:nvPr>
+            <p:ph type="body" idx="1"/>
+          </p:nvPr>
+        </p:nvSpPr>
+        <p:spPr/>
+        <p:txBody>
+          <a:bodyPr/>
+          <a:lstStyle/>
+          <a:p>
+            <a:pPr indent="-228600" algn="r">
+              <a:buFont typeface="Arial" panose="020B0604020202020204" pitchFamily="34" charset="0"/>
+              <a:buChar char="•"/>
+            </a:pPr>
+            <a:r>
+              <a:rPr lang="he-IL" sz="1200" dirty="0"/>
+              <a:t>בכל שלב הזהב והיהלומים נמצאים בד"כ אחרי אבנים , בכדי להקשות על השחקן </a:t>
+            </a:r>
+          </a:p>
+          <a:p>
+            <a:pPr indent="-228600" algn="r">
+              <a:buFont typeface="Arial" panose="020B0604020202020204" pitchFamily="34" charset="0"/>
+              <a:buChar char="•"/>
+            </a:pPr>
+            <a:r>
+              <a:rPr lang="he-IL" sz="1200" dirty="0"/>
+              <a:t>בכך שבכל פעם שהוא מנסה לתפוס זהב יכול להיות שהוא בטעות ייקח אבן או יפספס</a:t>
+            </a:r>
+          </a:p>
+          <a:p>
+            <a:pPr indent="-228600" algn="r">
+              <a:buFont typeface="Arial" panose="020B0604020202020204" pitchFamily="34" charset="0"/>
+              <a:buChar char="•"/>
+            </a:pPr>
+            <a:r>
+              <a:rPr lang="he-IL" sz="1200" dirty="0"/>
+              <a:t>לכן על השחקן להחליט בכל פעם האם כדי לו להחליף אסטרטגיה ולנסות לתפוס אוצר אחר</a:t>
+            </a:r>
+          </a:p>
+          <a:p>
+            <a:pPr indent="-228600" algn="r">
+              <a:buFont typeface="Arial" panose="020B0604020202020204" pitchFamily="34" charset="0"/>
+              <a:buChar char="•"/>
+            </a:pPr>
+            <a:r>
+              <a:rPr lang="he-IL" sz="1200" dirty="0"/>
+              <a:t>בנוסף גם הגלגלת זזה מצב לצד באיטיות וכך מקשה על השחקן עוד יותר</a:t>
+            </a:r>
+            <a:endParaRPr lang="en-US" sz="1200" dirty="0"/>
+          </a:p>
+          <a:p>
+            <a:endParaRPr lang="en-IL" dirty="0"/>
+          </a:p>
+        </p:txBody>
+      </p:sp>
+      <p:sp>
+        <p:nvSpPr>
+          <p:cNvPr id="4" name="מציין מיקום של מספר שקופית 3"/>
+          <p:cNvSpPr>
+            <a:spLocks noGrp="1"/>
+          </p:cNvSpPr>
+          <p:nvPr>
+            <p:ph type="sldNum" sz="quarter" idx="5"/>
+          </p:nvPr>
+        </p:nvSpPr>
+        <p:spPr/>
+        <p:txBody>
+          <a:bodyPr/>
+          <a:lstStyle/>
+          <a:p>
+            <a:fld id="{5224633E-AE6C-45DA-B5C2-DE4EC2DC249C}" type="slidenum">
+              <a:rPr lang="en-IL" smtClean="0"/>
+              <a:t>5</a:t>
+            </a:fld>
+            <a:endParaRPr lang="en-IL"/>
+          </a:p>
+        </p:txBody>
+      </p:sp>
+    </p:spTree>
+    <p:extLst>
+      <p:ext uri="{BB962C8B-B14F-4D97-AF65-F5344CB8AC3E}">
+        <p14:creationId xmlns:p14="http://schemas.microsoft.com/office/powerpoint/2010/main" val="3005302553"/>
+      </p:ext>
+    </p:extLst>
+  </p:cSld>
+  <p:clrMapOvr>
+    <a:masterClrMapping/>
+  </p:clrMapOvr>
+</p:notes>
+</file>
+
+<file path=ppt/notesSlides/notesSlide5.xml><?xml version="1.0" encoding="utf-8"?>
+<p:notes xmlns:a="http://schemas.openxmlformats.org/drawingml/2006/main" xmlns:r="http://schemas.openxmlformats.org/officeDocument/2006/relationships" xmlns:p="http://schemas.openxmlformats.org/presentationml/2006/main">
+  <p:cSld>
+    <p:spTree>
+      <p:nvGrpSpPr>
+        <p:cNvPr id="1" name=""/>
+        <p:cNvGrpSpPr/>
+        <p:nvPr/>
+      </p:nvGrpSpPr>
+      <p:grpSpPr>
+        <a:xfrm>
+          <a:off x="0" y="0"/>
+          <a:ext cx="0" cy="0"/>
+          <a:chOff x="0" y="0"/>
+          <a:chExt cx="0" cy="0"/>
+        </a:xfrm>
+      </p:grpSpPr>
+      <p:sp>
+        <p:nvSpPr>
+          <p:cNvPr id="2" name="מציין מיקום של תמונת שקופית 1"/>
+          <p:cNvSpPr>
+            <a:spLocks noGrp="1" noRot="1" noChangeAspect="1"/>
+          </p:cNvSpPr>
+          <p:nvPr>
+            <p:ph type="sldImg"/>
+          </p:nvPr>
+        </p:nvSpPr>
+        <p:spPr/>
+      </p:sp>
+      <p:sp>
+        <p:nvSpPr>
+          <p:cNvPr id="3" name="מציין מיקום של הערות 2"/>
+          <p:cNvSpPr>
+            <a:spLocks noGrp="1"/>
+          </p:cNvSpPr>
+          <p:nvPr>
+            <p:ph type="body" idx="1"/>
+          </p:nvPr>
+        </p:nvSpPr>
+        <p:spPr/>
+        <p:txBody>
+          <a:bodyPr/>
+          <a:lstStyle/>
+          <a:p>
+            <a:pPr marL="342900" indent="-342900" algn="r">
+              <a:buFont typeface="Arial" panose="020B0604020202020204" pitchFamily="34" charset="0"/>
+              <a:buChar char="•"/>
+            </a:pPr>
+            <a:r>
+              <a:rPr lang="he-IL" sz="1200" dirty="0"/>
+              <a:t>לאחר כל שלב השחקן מגיע לחנות ויכול לרכוש מוצרים שיוכלו לעזור לו לעבור את השלב הבא בקלות</a:t>
+            </a:r>
+          </a:p>
+          <a:p>
+            <a:pPr marL="342900" indent="-342900" algn="r">
+              <a:buFont typeface="Arial" panose="020B0604020202020204" pitchFamily="34" charset="0"/>
+              <a:buChar char="•"/>
+            </a:pPr>
+            <a:r>
+              <a:rPr lang="he-IL" sz="1200" dirty="0"/>
+              <a:t>השחקן יכול לרכוש בעזרת הכסף שצבר במהלך השלב , כמובן שהקניה צריכה להיות חכמה כיוון שהוא מתחיל את השלב הבא עם פחות כסף , כלומר עליו להשיג סכום כסף גדול יותר בכדי לעבור את השלב</a:t>
+            </a:r>
+          </a:p>
+          <a:p>
+            <a:pPr marL="342900" indent="-342900" algn="r">
+              <a:buFont typeface="Arial" panose="020B0604020202020204" pitchFamily="34" charset="0"/>
+              <a:buChar char="•"/>
+            </a:pPr>
+            <a:r>
+              <a:rPr lang="he-IL" sz="1200" dirty="0"/>
+              <a:t>המחיר של הסחורה משתנה משלב ולשלב , הוא מוצע כך שאם הסכום שלך גבוה מאוד כך גם הסחורה תהיה יקרה וזאת בכדי לאזן את המשחק ולגרום לשחקן לאתגר בכל שלב</a:t>
+            </a:r>
+          </a:p>
+          <a:p>
+            <a:endParaRPr lang="en-IL" dirty="0"/>
+          </a:p>
+        </p:txBody>
+      </p:sp>
+      <p:sp>
+        <p:nvSpPr>
+          <p:cNvPr id="4" name="מציין מיקום של מספר שקופית 3"/>
+          <p:cNvSpPr>
+            <a:spLocks noGrp="1"/>
+          </p:cNvSpPr>
+          <p:nvPr>
+            <p:ph type="sldNum" sz="quarter" idx="5"/>
+          </p:nvPr>
+        </p:nvSpPr>
+        <p:spPr/>
+        <p:txBody>
+          <a:bodyPr/>
+          <a:lstStyle/>
+          <a:p>
+            <a:fld id="{5224633E-AE6C-45DA-B5C2-DE4EC2DC249C}" type="slidenum">
+              <a:rPr lang="en-IL" smtClean="0"/>
+              <a:t>6</a:t>
+            </a:fld>
+            <a:endParaRPr lang="en-IL"/>
+          </a:p>
+        </p:txBody>
+      </p:sp>
+    </p:spTree>
+    <p:extLst>
+      <p:ext uri="{BB962C8B-B14F-4D97-AF65-F5344CB8AC3E}">
+        <p14:creationId xmlns:p14="http://schemas.microsoft.com/office/powerpoint/2010/main" val="45398390"/>
+      </p:ext>
+    </p:extLst>
+  </p:cSld>
+  <p:clrMapOvr>
+    <a:masterClrMapping/>
+  </p:clrMapOvr>
+</p:notes>
+</file>
+
+<file path=ppt/notesSlides/notesSlide6.xml><?xml version="1.0" encoding="utf-8"?>
+<p:notes xmlns:a="http://schemas.openxmlformats.org/drawingml/2006/main" xmlns:r="http://schemas.openxmlformats.org/officeDocument/2006/relationships" xmlns:p="http://schemas.openxmlformats.org/presentationml/2006/main">
+  <p:cSld>
+    <p:spTree>
+      <p:nvGrpSpPr>
+        <p:cNvPr id="1" name=""/>
+        <p:cNvGrpSpPr/>
+        <p:nvPr/>
+      </p:nvGrpSpPr>
+      <p:grpSpPr>
+        <a:xfrm>
+          <a:off x="0" y="0"/>
+          <a:ext cx="0" cy="0"/>
+          <a:chOff x="0" y="0"/>
+          <a:chExt cx="0" cy="0"/>
+        </a:xfrm>
+      </p:grpSpPr>
+      <p:sp>
+        <p:nvSpPr>
+          <p:cNvPr id="2" name="מציין מיקום של תמונת שקופית 1"/>
+          <p:cNvSpPr>
+            <a:spLocks noGrp="1" noRot="1" noChangeAspect="1"/>
+          </p:cNvSpPr>
+          <p:nvPr>
+            <p:ph type="sldImg"/>
+          </p:nvPr>
+        </p:nvSpPr>
+        <p:spPr/>
+      </p:sp>
+      <p:sp>
+        <p:nvSpPr>
+          <p:cNvPr id="3" name="מציין מיקום של הערות 2"/>
+          <p:cNvSpPr>
+            <a:spLocks noGrp="1"/>
+          </p:cNvSpPr>
+          <p:nvPr>
+            <p:ph type="body" idx="1"/>
+          </p:nvPr>
+        </p:nvSpPr>
+        <p:spPr/>
+        <p:txBody>
+          <a:bodyPr/>
+          <a:lstStyle/>
+          <a:p>
+            <a:pPr indent="-228600" algn="r">
+              <a:buFont typeface="Arial" panose="020B0604020202020204" pitchFamily="34" charset="0"/>
+              <a:buChar char="•"/>
+            </a:pPr>
+            <a:r>
+              <a:rPr lang="he-IL" sz="2400" dirty="0"/>
+              <a:t>בכל רגע במשחק השחקן יכול לראות את סכום הכסף שיש ברשותו כרגע</a:t>
+            </a:r>
+          </a:p>
+          <a:p>
+            <a:pPr indent="-228600" algn="r">
+              <a:buFont typeface="Arial" panose="020B0604020202020204" pitchFamily="34" charset="0"/>
+              <a:buChar char="•"/>
+            </a:pPr>
+            <a:r>
+              <a:rPr lang="he-IL" sz="2400" dirty="0"/>
+              <a:t>במהלך השלב השחקן יכול לראות </a:t>
+            </a:r>
+          </a:p>
+          <a:p>
+            <a:pPr marL="742950" lvl="1" indent="-285750">
+              <a:buFont typeface="Arial" panose="020B0604020202020204" pitchFamily="34" charset="0"/>
+              <a:buChar char="•"/>
+            </a:pPr>
+            <a:r>
+              <a:rPr lang="he-IL" sz="1600" dirty="0"/>
+              <a:t>איזה שלב הוא נמצא</a:t>
+            </a:r>
+          </a:p>
+          <a:p>
+            <a:pPr marL="742950" lvl="1" indent="-285750">
+              <a:buFont typeface="Arial" panose="020B0604020202020204" pitchFamily="34" charset="0"/>
+              <a:buChar char="•"/>
+            </a:pPr>
+            <a:r>
+              <a:rPr lang="he-IL" sz="1600" dirty="0"/>
+              <a:t>כמה זמן נותר לשלב</a:t>
+            </a:r>
+          </a:p>
+          <a:p>
+            <a:pPr marL="742950" lvl="1" indent="-285750">
+              <a:buFont typeface="Arial" panose="020B0604020202020204" pitchFamily="34" charset="0"/>
+              <a:buChar char="•"/>
+            </a:pPr>
+            <a:r>
+              <a:rPr lang="he-IL" sz="1600" dirty="0"/>
+              <a:t>מה סכום הכסף שצבר</a:t>
+            </a:r>
+          </a:p>
+          <a:p>
+            <a:pPr marL="742950" lvl="1" indent="-285750">
+              <a:buFont typeface="Arial" panose="020B0604020202020204" pitchFamily="34" charset="0"/>
+              <a:buChar char="•"/>
+            </a:pPr>
+            <a:r>
+              <a:rPr lang="he-IL" sz="1600" dirty="0"/>
+              <a:t>כמה כסף צריך לצבור בכדי לעבור את השלב</a:t>
+            </a:r>
+          </a:p>
+          <a:p>
+            <a:pPr indent="-228600" algn="r">
+              <a:buFont typeface="Arial" panose="020B0604020202020204" pitchFamily="34" charset="0"/>
+              <a:buChar char="•"/>
+            </a:pPr>
+            <a:r>
+              <a:rPr lang="he-IL" sz="2400" dirty="0"/>
+              <a:t>נקודת המבט במשחק זה היא צידית</a:t>
+            </a:r>
+            <a:endParaRPr lang="en-US" sz="2400" dirty="0"/>
+          </a:p>
+          <a:p>
+            <a:endParaRPr lang="en-IL" b="1" dirty="0"/>
+          </a:p>
+        </p:txBody>
+      </p:sp>
+      <p:sp>
+        <p:nvSpPr>
+          <p:cNvPr id="4" name="מציין מיקום של מספר שקופית 3"/>
+          <p:cNvSpPr>
+            <a:spLocks noGrp="1"/>
+          </p:cNvSpPr>
+          <p:nvPr>
+            <p:ph type="sldNum" sz="quarter" idx="5"/>
+          </p:nvPr>
+        </p:nvSpPr>
+        <p:spPr/>
+        <p:txBody>
+          <a:bodyPr/>
+          <a:lstStyle/>
+          <a:p>
+            <a:fld id="{5224633E-AE6C-45DA-B5C2-DE4EC2DC249C}" type="slidenum">
+              <a:rPr lang="en-IL" smtClean="0"/>
+              <a:t>7</a:t>
+            </a:fld>
+            <a:endParaRPr lang="en-IL"/>
+          </a:p>
+        </p:txBody>
+      </p:sp>
+    </p:spTree>
+    <p:extLst>
+      <p:ext uri="{BB962C8B-B14F-4D97-AF65-F5344CB8AC3E}">
+        <p14:creationId xmlns:p14="http://schemas.microsoft.com/office/powerpoint/2010/main" val="251206081"/>
+      </p:ext>
+    </p:extLst>
+  </p:cSld>
+  <p:clrMapOvr>
+    <a:masterClrMapping/>
+  </p:clrMapOvr>
+</p:notes>
+</file>
+
+<file path=ppt/notesSlides/notesSlide7.xml><?xml version="1.0" encoding="utf-8"?>
+<p:notes xmlns:a="http://schemas.openxmlformats.org/drawingml/2006/main" xmlns:r="http://schemas.openxmlformats.org/officeDocument/2006/relationships" xmlns:p="http://schemas.openxmlformats.org/presentationml/2006/main">
+  <p:cSld>
+    <p:spTree>
+      <p:nvGrpSpPr>
+        <p:cNvPr id="1" name=""/>
+        <p:cNvGrpSpPr/>
+        <p:nvPr/>
+      </p:nvGrpSpPr>
+      <p:grpSpPr>
+        <a:xfrm>
+          <a:off x="0" y="0"/>
+          <a:ext cx="0" cy="0"/>
+          <a:chOff x="0" y="0"/>
+          <a:chExt cx="0" cy="0"/>
+        </a:xfrm>
+      </p:grpSpPr>
+      <p:sp>
+        <p:nvSpPr>
+          <p:cNvPr id="2" name="מציין מיקום של תמונת שקופית 1"/>
+          <p:cNvSpPr>
+            <a:spLocks noGrp="1" noRot="1" noChangeAspect="1"/>
+          </p:cNvSpPr>
+          <p:nvPr>
+            <p:ph type="sldImg"/>
+          </p:nvPr>
+        </p:nvSpPr>
+        <p:spPr/>
+      </p:sp>
+      <p:sp>
+        <p:nvSpPr>
+          <p:cNvPr id="3" name="מציין מיקום של הערות 2"/>
+          <p:cNvSpPr>
+            <a:spLocks noGrp="1"/>
+          </p:cNvSpPr>
+          <p:nvPr>
+            <p:ph type="body" idx="1"/>
+          </p:nvPr>
+        </p:nvSpPr>
+        <p:spPr/>
+        <p:txBody>
+          <a:bodyPr/>
+          <a:lstStyle/>
+          <a:p>
+            <a:pPr algn="r"/>
+            <a:r>
+              <a:rPr lang="he-IL" sz="1200" dirty="0"/>
+              <a:t>במשחק זה כל השליטה היא ישירה , ומתנהלת בזמן אמת</a:t>
+            </a:r>
+          </a:p>
+          <a:p>
+            <a:pPr indent="-228600" algn="r">
+              <a:buFont typeface="Arial" panose="020B0604020202020204" pitchFamily="34" charset="0"/>
+              <a:buChar char="•"/>
+            </a:pPr>
+            <a:r>
+              <a:rPr lang="he-IL" sz="1200" dirty="0"/>
+              <a:t>בכדי להוריד את הגלגלת נשתמש בכפתור למטה</a:t>
+            </a:r>
+          </a:p>
+          <a:p>
+            <a:pPr indent="-228600" algn="r">
+              <a:buFont typeface="Arial" panose="020B0604020202020204" pitchFamily="34" charset="0"/>
+              <a:buChar char="•"/>
+            </a:pPr>
+            <a:r>
+              <a:rPr lang="he-IL" sz="1200" dirty="0"/>
+              <a:t>בכדי לפוצץ דינמיט נשתמש בכפתור למעלה </a:t>
+            </a:r>
+          </a:p>
+          <a:p>
+            <a:pPr indent="-228600" algn="r">
+              <a:buFont typeface="Arial" panose="020B0604020202020204" pitchFamily="34" charset="0"/>
+              <a:buChar char="•"/>
+            </a:pPr>
+            <a:r>
+              <a:rPr lang="he-IL" sz="1200" dirty="0"/>
+              <a:t>בכדי לקנות בחנות נשתמש בעכבר לבחירת הסחורה</a:t>
+            </a:r>
+          </a:p>
+          <a:p>
+            <a:endParaRPr lang="en-IL" dirty="0"/>
+          </a:p>
+        </p:txBody>
+      </p:sp>
+      <p:sp>
+        <p:nvSpPr>
+          <p:cNvPr id="4" name="מציין מיקום של מספר שקופית 3"/>
+          <p:cNvSpPr>
+            <a:spLocks noGrp="1"/>
+          </p:cNvSpPr>
+          <p:nvPr>
+            <p:ph type="sldNum" sz="quarter" idx="5"/>
+          </p:nvPr>
+        </p:nvSpPr>
+        <p:spPr/>
+        <p:txBody>
+          <a:bodyPr/>
+          <a:lstStyle/>
+          <a:p>
+            <a:fld id="{5224633E-AE6C-45DA-B5C2-DE4EC2DC249C}" type="slidenum">
+              <a:rPr lang="en-IL" smtClean="0"/>
+              <a:t>8</a:t>
+            </a:fld>
+            <a:endParaRPr lang="en-IL"/>
+          </a:p>
+        </p:txBody>
+      </p:sp>
+    </p:spTree>
+    <p:extLst>
+      <p:ext uri="{BB962C8B-B14F-4D97-AF65-F5344CB8AC3E}">
+        <p14:creationId xmlns:p14="http://schemas.microsoft.com/office/powerpoint/2010/main" val="2603135623"/>
+      </p:ext>
+    </p:extLst>
+  </p:cSld>
+  <p:clrMapOvr>
+    <a:masterClrMapping/>
+  </p:clrMapOvr>
+</p:notes>
+</file>
+
 <file path=ppt/slideLayouts/slideLayout1.xml><?xml version="1.0" encoding="utf-8"?>
 <p:sldLayout xmlns:a="http://schemas.openxmlformats.org/drawingml/2006/main" xmlns:r="http://schemas.openxmlformats.org/officeDocument/2006/relationships" xmlns:p="http://schemas.openxmlformats.org/presentationml/2006/main" type="title" preserve="1">
   <p:cSld name="שקופית כותרת">
@@ -269,7 +1656,7 @@
           <a:p>
             <a:fld id="{8AB43C3E-6043-49D6-BC3A-F9A906F1376D}" type="datetimeFigureOut">
               <a:rPr lang="en-IL" smtClean="0"/>
-              <a:t>19/04/2020</a:t>
+              <a:t>20/04/2020</a:t>
             </a:fld>
             <a:endParaRPr lang="en-IL"/>
           </a:p>
@@ -469,7 +1856,7 @@
           <a:p>
             <a:fld id="{8AB43C3E-6043-49D6-BC3A-F9A906F1376D}" type="datetimeFigureOut">
               <a:rPr lang="en-IL" smtClean="0"/>
-              <a:t>19/04/2020</a:t>
+              <a:t>20/04/2020</a:t>
             </a:fld>
             <a:endParaRPr lang="en-IL"/>
           </a:p>
@@ -679,7 +2066,7 @@
           <a:p>
             <a:fld id="{8AB43C3E-6043-49D6-BC3A-F9A906F1376D}" type="datetimeFigureOut">
               <a:rPr lang="en-IL" smtClean="0"/>
-              <a:t>19/04/2020</a:t>
+              <a:t>20/04/2020</a:t>
             </a:fld>
             <a:endParaRPr lang="en-IL"/>
           </a:p>
@@ -879,7 +2266,7 @@
           <a:p>
             <a:fld id="{8AB43C3E-6043-49D6-BC3A-F9A906F1376D}" type="datetimeFigureOut">
               <a:rPr lang="en-IL" smtClean="0"/>
-              <a:t>19/04/2020</a:t>
+              <a:t>20/04/2020</a:t>
             </a:fld>
             <a:endParaRPr lang="en-IL"/>
           </a:p>
@@ -1155,7 +2542,7 @@
           <a:p>
             <a:fld id="{8AB43C3E-6043-49D6-BC3A-F9A906F1376D}" type="datetimeFigureOut">
               <a:rPr lang="en-IL" smtClean="0"/>
-              <a:t>19/04/2020</a:t>
+              <a:t>20/04/2020</a:t>
             </a:fld>
             <a:endParaRPr lang="en-IL"/>
           </a:p>
@@ -1423,7 +2810,7 @@
           <a:p>
             <a:fld id="{8AB43C3E-6043-49D6-BC3A-F9A906F1376D}" type="datetimeFigureOut">
               <a:rPr lang="en-IL" smtClean="0"/>
-              <a:t>19/04/2020</a:t>
+              <a:t>20/04/2020</a:t>
             </a:fld>
             <a:endParaRPr lang="en-IL"/>
           </a:p>
@@ -1838,7 +3225,7 @@
           <a:p>
             <a:fld id="{8AB43C3E-6043-49D6-BC3A-F9A906F1376D}" type="datetimeFigureOut">
               <a:rPr lang="en-IL" smtClean="0"/>
-              <a:t>19/04/2020</a:t>
+              <a:t>20/04/2020</a:t>
             </a:fld>
             <a:endParaRPr lang="en-IL"/>
           </a:p>
@@ -1980,7 +3367,7 @@
           <a:p>
             <a:fld id="{8AB43C3E-6043-49D6-BC3A-F9A906F1376D}" type="datetimeFigureOut">
               <a:rPr lang="en-IL" smtClean="0"/>
-              <a:t>19/04/2020</a:t>
+              <a:t>20/04/2020</a:t>
             </a:fld>
             <a:endParaRPr lang="en-IL"/>
           </a:p>
@@ -2093,7 +3480,7 @@
           <a:p>
             <a:fld id="{8AB43C3E-6043-49D6-BC3A-F9A906F1376D}" type="datetimeFigureOut">
               <a:rPr lang="en-IL" smtClean="0"/>
-              <a:t>19/04/2020</a:t>
+              <a:t>20/04/2020</a:t>
             </a:fld>
             <a:endParaRPr lang="en-IL"/>
           </a:p>
@@ -2406,7 +3793,7 @@
           <a:p>
             <a:fld id="{8AB43C3E-6043-49D6-BC3A-F9A906F1376D}" type="datetimeFigureOut">
               <a:rPr lang="en-IL" smtClean="0"/>
-              <a:t>19/04/2020</a:t>
+              <a:t>20/04/2020</a:t>
             </a:fld>
             <a:endParaRPr lang="en-IL"/>
           </a:p>
@@ -2695,7 +4082,7 @@
           <a:p>
             <a:fld id="{8AB43C3E-6043-49D6-BC3A-F9A906F1376D}" type="datetimeFigureOut">
               <a:rPr lang="en-IL" smtClean="0"/>
-              <a:t>19/04/2020</a:t>
+              <a:t>20/04/2020</a:t>
             </a:fld>
             <a:endParaRPr lang="en-IL"/>
           </a:p>
@@ -2938,7 +4325,7 @@
           <a:p>
             <a:fld id="{8AB43C3E-6043-49D6-BC3A-F9A906F1376D}" type="datetimeFigureOut">
               <a:rPr lang="en-IL" smtClean="0"/>
-              <a:t>19/04/2020</a:t>
+              <a:t>20/04/2020</a:t>
             </a:fld>
             <a:endParaRPr lang="en-IL"/>
           </a:p>
@@ -3555,47 +4942,6 @@
           </a:p>
         </p:txBody>
       </p:sp>
-      <p:pic>
-        <p:nvPicPr>
-          <p:cNvPr id="5" name="תמונה 4" descr="תמונה שמכילה שעון, מחשב, אור&#10;&#10;התיאור נוצר באופן אוטומטי">
-            <a:extLst>
-              <a:ext uri="{FF2B5EF4-FFF2-40B4-BE49-F238E27FC236}">
-                <a16:creationId xmlns:a16="http://schemas.microsoft.com/office/drawing/2014/main" id="{17071874-C7CB-4101-BD41-C1943D35E6C3}"/>
-              </a:ext>
-            </a:extLst>
-          </p:cNvPr>
-          <p:cNvPicPr>
-            <a:picLocks noChangeAspect="1"/>
-          </p:cNvPicPr>
-          <p:nvPr/>
-        </p:nvPicPr>
-        <p:blipFill rotWithShape="1">
-          <a:blip r:embed="rId2">
-            <a:extLst>
-              <a:ext uri="{28A0092B-C50C-407E-A947-70E740481C1C}">
-                <a14:useLocalDpi xmlns:a14="http://schemas.microsoft.com/office/drawing/2010/main" val="0"/>
-              </a:ext>
-            </a:extLst>
-          </a:blip>
-          <a:srcRect l="3617" r="7494"/>
-          <a:stretch/>
-        </p:blipFill>
-        <p:spPr>
-          <a:xfrm>
-            <a:off x="716280" y="1618723"/>
-            <a:ext cx="6436548" cy="3620553"/>
-          </a:xfrm>
-          <a:prstGeom prst="rect">
-            <a:avLst/>
-          </a:prstGeom>
-          <a:ln>
-            <a:noFill/>
-          </a:ln>
-          <a:effectLst>
-            <a:softEdge rad="112500"/>
-          </a:effectLst>
-        </p:spPr>
-      </p:pic>
       <p:cxnSp>
         <p:nvCxnSpPr>
           <p:cNvPr id="19" name="Straight Connector 18">
@@ -3648,6 +4994,39 @@
           </a:fontRef>
         </p:style>
       </p:cxnSp>
+      <p:pic>
+        <p:nvPicPr>
+          <p:cNvPr id="7" name="מדיה מקוונת 9" title="Gold Miner Full Gameplay Walkthrough">
+            <a:hlinkClick r:id="" action="ppaction://media"/>
+            <a:extLst>
+              <a:ext uri="{FF2B5EF4-FFF2-40B4-BE49-F238E27FC236}">
+                <a16:creationId xmlns:a16="http://schemas.microsoft.com/office/drawing/2014/main" id="{C57EF158-3C36-4F59-A450-2ADE8580D206}"/>
+              </a:ext>
+            </a:extLst>
+          </p:cNvPr>
+          <p:cNvPicPr>
+            <a:picLocks noRot="1" noChangeAspect="1"/>
+          </p:cNvPicPr>
+          <p:nvPr>
+            <a:videoFile r:link="rId1"/>
+          </p:nvPr>
+        </p:nvPicPr>
+        <p:blipFill>
+          <a:blip r:embed="rId3"/>
+          <a:stretch>
+            <a:fillRect/>
+          </a:stretch>
+        </p:blipFill>
+        <p:spPr>
+          <a:xfrm>
+            <a:off x="1124684" y="1834330"/>
+            <a:ext cx="5669936" cy="3189339"/>
+          </a:xfrm>
+          <a:prstGeom prst="rect">
+            <a:avLst/>
+          </a:prstGeom>
+        </p:spPr>
+      </p:pic>
     </p:spTree>
     <p:extLst>
       <p:ext uri="{BB962C8B-B14F-4D97-AF65-F5344CB8AC3E}">
@@ -3658,6 +5037,141 @@
   <p:clrMapOvr>
     <a:overrideClrMapping bg1="dk1" tx1="lt1" bg2="dk2" tx2="lt2" accent1="accent1" accent2="accent2" accent3="accent3" accent4="accent4" accent5="accent5" accent6="accent6" hlink="hlink" folHlink="folHlink"/>
   </p:clrMapOvr>
+  <p:timing>
+    <p:tnLst>
+      <p:par>
+        <p:cTn id="1" dur="indefinite" restart="never" nodeType="tmRoot">
+          <p:childTnLst>
+            <p:seq concurrent="1" nextAc="seek">
+              <p:cTn id="2" dur="indefinite" nodeType="mainSeq">
+                <p:childTnLst>
+                  <p:par>
+                    <p:cTn id="3" fill="hold">
+                      <p:stCondLst>
+                        <p:cond delay="indefinite"/>
+                      </p:stCondLst>
+                      <p:childTnLst>
+                        <p:par>
+                          <p:cTn id="4" fill="hold">
+                            <p:stCondLst>
+                              <p:cond delay="0"/>
+                            </p:stCondLst>
+                            <p:childTnLst>
+                              <p:par>
+                                <p:cTn id="5" presetID="1" presetClass="mediacall" presetSubtype="0" fill="hold" nodeType="clickEffect">
+                                  <p:stCondLst>
+                                    <p:cond delay="0"/>
+                                  </p:stCondLst>
+                                  <p:childTnLst>
+                                    <p:cmd type="call" cmd="playFrom(0.0)">
+                                      <p:cBhvr>
+                                        <p:cTn id="6" dur="1" fill="hold"/>
+                                        <p:tgtEl>
+                                          <p:spTgt spid="7"/>
+                                        </p:tgtEl>
+                                      </p:cBhvr>
+                                    </p:cmd>
+                                  </p:childTnLst>
+                                </p:cTn>
+                              </p:par>
+                            </p:childTnLst>
+                          </p:cTn>
+                        </p:par>
+                      </p:childTnLst>
+                    </p:cTn>
+                  </p:par>
+                </p:childTnLst>
+              </p:cTn>
+              <p:prevCondLst>
+                <p:cond evt="onPrev" delay="0">
+                  <p:tgtEl>
+                    <p:sldTgt/>
+                  </p:tgtEl>
+                </p:cond>
+              </p:prevCondLst>
+              <p:nextCondLst>
+                <p:cond evt="onNext" delay="0">
+                  <p:tgtEl>
+                    <p:sldTgt/>
+                  </p:tgtEl>
+                </p:cond>
+              </p:nextCondLst>
+            </p:seq>
+            <p:seq concurrent="1" nextAc="seek">
+              <p:cTn id="7" restart="whenNotActive" fill="hold" evtFilter="cancelBubble" nodeType="interactiveSeq">
+                <p:stCondLst>
+                  <p:cond evt="onClick" delay="0">
+                    <p:tgtEl>
+                      <p:spTgt spid="7"/>
+                    </p:tgtEl>
+                  </p:cond>
+                </p:stCondLst>
+                <p:endSync evt="end" delay="0">
+                  <p:rtn val="all"/>
+                </p:endSync>
+                <p:childTnLst>
+                  <p:par>
+                    <p:cTn id="8" fill="hold">
+                      <p:stCondLst>
+                        <p:cond delay="0"/>
+                      </p:stCondLst>
+                      <p:childTnLst>
+                        <p:par>
+                          <p:cTn id="9" fill="hold">
+                            <p:stCondLst>
+                              <p:cond delay="0"/>
+                            </p:stCondLst>
+                            <p:childTnLst>
+                              <p:par>
+                                <p:cTn id="10" presetID="2" presetClass="mediacall" presetSubtype="0" fill="hold" nodeType="clickEffect">
+                                  <p:stCondLst>
+                                    <p:cond delay="0"/>
+                                  </p:stCondLst>
+                                  <p:childTnLst>
+                                    <p:cmd type="call" cmd="togglePause">
+                                      <p:cBhvr>
+                                        <p:cTn id="11" dur="1" fill="hold"/>
+                                        <p:tgtEl>
+                                          <p:spTgt spid="7"/>
+                                        </p:tgtEl>
+                                      </p:cBhvr>
+                                    </p:cmd>
+                                  </p:childTnLst>
+                                </p:cTn>
+                              </p:par>
+                            </p:childTnLst>
+                          </p:cTn>
+                        </p:par>
+                      </p:childTnLst>
+                    </p:cTn>
+                  </p:par>
+                </p:childTnLst>
+              </p:cTn>
+              <p:nextCondLst>
+                <p:cond evt="onClick" delay="0">
+                  <p:tgtEl>
+                    <p:spTgt spid="7"/>
+                  </p:tgtEl>
+                </p:cond>
+              </p:nextCondLst>
+            </p:seq>
+            <p:video>
+              <p:cMediaNode vol="80000">
+                <p:cTn id="12" fill="hold" display="0">
+                  <p:stCondLst>
+                    <p:cond delay="indefinite"/>
+                  </p:stCondLst>
+                </p:cTn>
+                <p:tgtEl>
+                  <p:spTgt spid="7"/>
+                </p:tgtEl>
+              </p:cMediaNode>
+            </p:video>
+          </p:childTnLst>
+        </p:cTn>
+      </p:par>
+    </p:tnLst>
+  </p:timing>
 </p:sld>
 </file>
 
@@ -3802,7 +5316,7 @@
           </p:nvPr>
         </p:nvPicPr>
         <p:blipFill rotWithShape="1">
-          <a:blip r:embed="rId2">
+          <a:blip r:embed="rId3">
             <a:extLst>
               <a:ext uri="{28A0092B-C50C-407E-A947-70E740481C1C}">
                 <a14:useLocalDpi xmlns:a14="http://schemas.microsoft.com/office/drawing/2010/main" val="0"/>
@@ -3897,7 +5411,7 @@
           <p:nvPr/>
         </p:nvPicPr>
         <p:blipFill>
-          <a:blip r:embed="rId3">
+          <a:blip r:embed="rId4">
             <a:extLst>
               <a:ext uri="{28A0092B-C50C-407E-A947-70E740481C1C}">
                 <a14:useLocalDpi xmlns:a14="http://schemas.microsoft.com/office/drawing/2010/main" val="0"/>
@@ -3939,14 +5453,14 @@
           <p:nvPr>
             <p:extLst>
               <p:ext uri="{D42A27DB-BD31-4B8C-83A1-F6EECF244321}">
-                <p14:modId xmlns:p14="http://schemas.microsoft.com/office/powerpoint/2010/main" val="1051539698"/>
+                <p14:modId xmlns:p14="http://schemas.microsoft.com/office/powerpoint/2010/main" val="1267303556"/>
               </p:ext>
             </p:extLst>
           </p:nvPr>
         </p:nvGraphicFramePr>
         <p:xfrm>
-          <a:off x="5353763" y="1911096"/>
-          <a:ext cx="6168591" cy="3332744"/>
+          <a:off x="5532779" y="1911096"/>
+          <a:ext cx="5810558" cy="3484071"/>
         </p:xfrm>
         <a:graphic>
           <a:graphicData uri="http://schemas.openxmlformats.org/drawingml/2006/table">
@@ -3955,21 +5469,14 @@
                 <a:tableStyleId>{2D5ABB26-0587-4C30-8999-92F81FD0307C}</a:tableStyleId>
               </a:tblPr>
               <a:tblGrid>
-                <a:gridCol w="1474230">
+                <a:gridCol w="2467808">
                   <a:extLst>
                     <a:ext uri="{9D8B030D-6E8A-4147-A177-3AD203B41FA5}">
                       <a16:colId xmlns:a16="http://schemas.microsoft.com/office/drawing/2014/main" val="1127339419"/>
                     </a:ext>
                   </a:extLst>
                 </a:gridCol>
-                <a:gridCol w="2072465">
-                  <a:extLst>
-                    <a:ext uri="{9D8B030D-6E8A-4147-A177-3AD203B41FA5}">
-                      <a16:colId xmlns:a16="http://schemas.microsoft.com/office/drawing/2014/main" val="2680541342"/>
-                    </a:ext>
-                  </a:extLst>
-                </a:gridCol>
-                <a:gridCol w="2621896">
+                <a:gridCol w="3342750">
                   <a:extLst>
                     <a:ext uri="{9D8B030D-6E8A-4147-A177-3AD203B41FA5}">
                       <a16:colId xmlns:a16="http://schemas.microsoft.com/office/drawing/2014/main" val="3509684306"/>
@@ -3977,7 +5484,7 @@
                   </a:extLst>
                 </a:gridCol>
               </a:tblGrid>
-              <a:tr h="445025">
+              <a:tr h="482311">
                 <a:tc>
                   <a:txBody>
                     <a:bodyPr/>
@@ -4007,43 +5514,36 @@
                   </a:txBody>
                   <a:tcPr/>
                 </a:tc>
-                <a:tc gridSpan="2">
+                <a:tc>
                   <a:txBody>
                     <a:bodyPr/>
                     <a:lstStyle/>
                     <a:p>
-                      <a:pPr algn="ctr"/>
                       <a:r>
-                        <a:rPr lang="he-IL" sz="2400" b="1" dirty="0">
+                        <a:rPr lang="he-IL" sz="2400" b="1" kern="1200" dirty="0">
                           <a:solidFill>
                             <a:schemeClr val="accent4">
                               <a:lumMod val="40000"/>
                               <a:lumOff val="60000"/>
                             </a:schemeClr>
                           </a:solidFill>
+                          <a:latin typeface="+mn-lt"/>
+                          <a:ea typeface="+mn-ea"/>
+                          <a:cs typeface="+mn-cs"/>
                         </a:rPr>
-                        <a:t>בחלון המשחק</a:t>
+                        <a:t>במשחק</a:t>
                       </a:r>
-                      <a:endParaRPr lang="en-IL" sz="2400" b="1" dirty="0">
+                      <a:endParaRPr lang="en-IL" sz="2400" b="1" kern="1200" dirty="0">
                         <a:solidFill>
                           <a:schemeClr val="accent4">
                             <a:lumMod val="40000"/>
                             <a:lumOff val="60000"/>
                           </a:schemeClr>
                         </a:solidFill>
+                        <a:latin typeface="+mn-lt"/>
+                        <a:ea typeface="+mn-ea"/>
+                        <a:cs typeface="+mn-cs"/>
                       </a:endParaRPr>
-                    </a:p>
-                  </a:txBody>
-                  <a:tcPr>
-                    <a:noFill/>
-                  </a:tcPr>
-                </a:tc>
-                <a:tc hMerge="1">
-                  <a:txBody>
-                    <a:bodyPr/>
-                    <a:lstStyle/>
-                    <a:p>
-                      <a:endParaRPr lang="en-IL"/>
                     </a:p>
                   </a:txBody>
                   <a:tcPr/>
@@ -4054,7 +5554,7 @@
                   </a:ext>
                 </a:extLst>
               </a:tr>
-              <a:tr h="410792">
+              <a:tr h="433355">
                 <a:tc>
                   <a:txBody>
                     <a:bodyPr/>
@@ -4067,24 +5567,6 @@
                       <a:r>
                         <a:rPr lang="he-IL" dirty="0"/>
                         <a:t>פצצה</a:t>
-                      </a:r>
-                      <a:endParaRPr lang="en-IL" dirty="0"/>
-                    </a:p>
-                  </a:txBody>
-                  <a:tcPr/>
-                </a:tc>
-                <a:tc>
-                  <a:txBody>
-                    <a:bodyPr/>
-                    <a:lstStyle/>
-                    <a:p>
-                      <a:pPr marL="285750" indent="-285750">
-                        <a:buFont typeface="Arial" panose="020B0604020202020204" pitchFamily="34" charset="0"/>
-                        <a:buChar char="•"/>
-                      </a:pPr>
-                      <a:r>
-                        <a:rPr lang="he-IL" dirty="0"/>
-                        <a:t>כסף שנצבר</a:t>
                       </a:r>
                       <a:endParaRPr lang="en-IL" dirty="0"/>
                     </a:p>
@@ -4114,7 +5596,7 @@
                   </a:ext>
                 </a:extLst>
               </a:tr>
-              <a:tr h="410792">
+              <a:tr h="414628">
                 <a:tc>
                   <a:txBody>
                     <a:bodyPr/>
@@ -4126,25 +5608,7 @@
                       </a:pPr>
                       <a:r>
                         <a:rPr lang="he-IL" dirty="0"/>
-                        <a:t>כד</a:t>
-                      </a:r>
-                      <a:endParaRPr lang="en-IL" dirty="0"/>
-                    </a:p>
-                  </a:txBody>
-                  <a:tcPr/>
-                </a:tc>
-                <a:tc>
-                  <a:txBody>
-                    <a:bodyPr/>
-                    <a:lstStyle/>
-                    <a:p>
-                      <a:pPr marL="285750" indent="-285750">
-                        <a:buFont typeface="Arial" panose="020B0604020202020204" pitchFamily="34" charset="0"/>
-                        <a:buChar char="•"/>
-                      </a:pPr>
-                      <a:r>
-                        <a:rPr lang="he-IL" dirty="0"/>
-                        <a:t>כסף שצריך לצבור</a:t>
+                        <a:t>משקה חוזק </a:t>
                       </a:r>
                       <a:endParaRPr lang="en-IL" dirty="0"/>
                     </a:p>
@@ -4175,7 +5639,7 @@
                   </a:ext>
                 </a:extLst>
               </a:tr>
-              <a:tr h="410792">
+              <a:tr h="433355">
                 <a:tc>
                   <a:txBody>
                     <a:bodyPr/>
@@ -4187,25 +5651,7 @@
                       </a:pPr>
                       <a:r>
                         <a:rPr lang="he-IL" dirty="0"/>
-                        <a:t>עלה</a:t>
-                      </a:r>
-                      <a:endParaRPr lang="en-IL" dirty="0"/>
-                    </a:p>
-                  </a:txBody>
-                  <a:tcPr/>
-                </a:tc>
-                <a:tc>
-                  <a:txBody>
-                    <a:bodyPr/>
-                    <a:lstStyle/>
-                    <a:p>
-                      <a:pPr marL="285750" indent="-285750">
-                        <a:buFont typeface="Arial" panose="020B0604020202020204" pitchFamily="34" charset="0"/>
-                        <a:buChar char="•"/>
-                      </a:pPr>
-                      <a:r>
-                        <a:rPr lang="he-IL" dirty="0"/>
-                        <a:t>זמן</a:t>
+                        <a:t>תלתן</a:t>
                       </a:r>
                       <a:endParaRPr lang="en-IL" dirty="0"/>
                     </a:p>
@@ -4236,7 +5682,7 @@
                   </a:ext>
                 </a:extLst>
               </a:tr>
-              <a:tr h="410792">
+              <a:tr h="433355">
                 <a:tc>
                   <a:txBody>
                     <a:bodyPr/>
@@ -4249,24 +5695,6 @@
                       <a:r>
                         <a:rPr lang="he-IL" dirty="0"/>
                         <a:t>ספר אבנים</a:t>
-                      </a:r>
-                      <a:endParaRPr lang="en-IL" dirty="0"/>
-                    </a:p>
-                  </a:txBody>
-                  <a:tcPr/>
-                </a:tc>
-                <a:tc>
-                  <a:txBody>
-                    <a:bodyPr/>
-                    <a:lstStyle/>
-                    <a:p>
-                      <a:pPr marL="285750" indent="-285750">
-                        <a:buFont typeface="Arial" panose="020B0604020202020204" pitchFamily="34" charset="0"/>
-                        <a:buChar char="•"/>
-                      </a:pPr>
-                      <a:r>
-                        <a:rPr lang="he-IL" dirty="0"/>
-                        <a:t>שלב</a:t>
                       </a:r>
                       <a:endParaRPr lang="en-IL" dirty="0"/>
                     </a:p>
@@ -4309,24 +5737,21 @@
                   </a:ext>
                 </a:extLst>
               </a:tr>
-              <a:tr h="410792">
+              <a:tr h="420357">
                 <a:tc>
                   <a:txBody>
                     <a:bodyPr/>
                     <a:lstStyle/>
                     <a:p>
-                      <a:pPr algn="ctr"/>
-                      <a:endParaRPr lang="en-IL"/>
-                    </a:p>
-                  </a:txBody>
-                  <a:tcPr/>
-                </a:tc>
-                <a:tc>
-                  <a:txBody>
-                    <a:bodyPr/>
-                    <a:lstStyle/>
-                    <a:p>
-                      <a:endParaRPr lang="en-IL"/>
+                      <a:pPr marL="285750" indent="-285750" algn="r">
+                        <a:buFont typeface="Arial" panose="020B0604020202020204" pitchFamily="34" charset="0"/>
+                        <a:buChar char="•"/>
+                      </a:pPr>
+                      <a:r>
+                        <a:rPr lang="he-IL" dirty="0"/>
+                        <a:t>מבריק יהלומים</a:t>
+                      </a:r>
+                      <a:endParaRPr lang="en-IL" dirty="0"/>
                     </a:p>
                   </a:txBody>
                   <a:tcPr/>
@@ -4367,23 +5792,13 @@
                   </a:ext>
                 </a:extLst>
               </a:tr>
-              <a:tr h="410792">
+              <a:tr h="433355">
                 <a:tc>
                   <a:txBody>
                     <a:bodyPr/>
                     <a:lstStyle/>
                     <a:p>
                       <a:pPr algn="ctr"/>
-                      <a:endParaRPr lang="en-IL"/>
-                    </a:p>
-                  </a:txBody>
-                  <a:tcPr/>
-                </a:tc>
-                <a:tc>
-                  <a:txBody>
-                    <a:bodyPr/>
-                    <a:lstStyle/>
-                    <a:p>
                       <a:endParaRPr lang="en-IL"/>
                     </a:p>
                   </a:txBody>
@@ -4425,7 +5840,7 @@
                   </a:ext>
                 </a:extLst>
               </a:tr>
-              <a:tr h="410792">
+              <a:tr h="433355">
                 <a:tc>
                   <a:txBody>
                     <a:bodyPr/>
@@ -4433,16 +5848,6 @@
                     <a:p>
                       <a:pPr algn="ctr"/>
                       <a:endParaRPr lang="en-IL"/>
-                    </a:p>
-                  </a:txBody>
-                  <a:tcPr/>
-                </a:tc>
-                <a:tc>
-                  <a:txBody>
-                    <a:bodyPr/>
-                    <a:lstStyle/>
-                    <a:p>
-                      <a:endParaRPr lang="en-IL" dirty="0"/>
                     </a:p>
                   </a:txBody>
                   <a:tcPr/>
@@ -4685,10 +6090,10 @@
       </p:cxnSp>
       <p:sp>
         <p:nvSpPr>
-          <p:cNvPr id="4" name="מציין מיקום טקסט 3">
-            <a:extLst>
-              <a:ext uri="{FF2B5EF4-FFF2-40B4-BE49-F238E27FC236}">
-                <a16:creationId xmlns:a16="http://schemas.microsoft.com/office/drawing/2014/main" id="{77D044F1-6916-454A-9A4B-A879649560DB}"/>
+          <p:cNvPr id="18" name="מציין מיקום טקסט 8">
+            <a:extLst>
+              <a:ext uri="{FF2B5EF4-FFF2-40B4-BE49-F238E27FC236}">
+                <a16:creationId xmlns:a16="http://schemas.microsoft.com/office/drawing/2014/main" id="{DFB0B2DA-248C-4538-B592-D0C6FC8A5220}"/>
               </a:ext>
             </a:extLst>
           </p:cNvPr>
@@ -4701,21 +6106,79 @@
         </p:nvSpPr>
         <p:spPr>
           <a:xfrm>
-            <a:off x="4976031" y="963877"/>
-            <a:ext cx="6377769" cy="4930246"/>
+            <a:off x="4734132" y="2377363"/>
+            <a:ext cx="7615687" cy="3210179"/>
           </a:xfrm>
         </p:spPr>
         <p:txBody>
-          <a:bodyPr vert="horz" lIns="91440" tIns="45720" rIns="91440" bIns="45720" rtlCol="0" anchor="ctr">
+          <a:bodyPr vert="horz" lIns="91440" tIns="45720" rIns="91440" bIns="45720" rtlCol="0" anchor="t">
             <a:normAutofit/>
           </a:bodyPr>
           <a:lstStyle/>
           <a:p>
-            <a:pPr indent="-228600" algn="l" rtl="0">
+            <a:pPr indent="-228600" algn="r">
               <a:buFont typeface="Arial" panose="020B0604020202020204" pitchFamily="34" charset="0"/>
               <a:buChar char="•"/>
             </a:pPr>
-            <a:endParaRPr lang="en-US" sz="2400" dirty="0"/>
+            <a:r>
+              <a:rPr lang="he-IL" sz="2000" dirty="0"/>
+              <a:t>במשחק זה לא קיים עצם מספרי אך יש כמה עצמים שיש לכם ערכים שונים</a:t>
+            </a:r>
+          </a:p>
+          <a:p>
+            <a:pPr lvl="2" indent="-228600">
+              <a:buFont typeface="Arial" panose="020B0604020202020204" pitchFamily="34" charset="0"/>
+              <a:buChar char="•"/>
+            </a:pPr>
+            <a:r>
+              <a:rPr lang="he-IL" sz="1600" dirty="0"/>
+              <a:t>יהלומים – ערך הכי גבוה במשחק</a:t>
+            </a:r>
+          </a:p>
+          <a:p>
+            <a:pPr lvl="2" indent="-228600">
+              <a:buFont typeface="Arial" panose="020B0604020202020204" pitchFamily="34" charset="0"/>
+              <a:buChar char="•"/>
+            </a:pPr>
+            <a:r>
+              <a:rPr lang="he-IL" sz="1600" dirty="0"/>
+              <a:t>זהב – יש כמה גדלים של זהב וכל גודל ערך שונה</a:t>
+            </a:r>
+          </a:p>
+          <a:p>
+            <a:pPr lvl="2" indent="-228600">
+              <a:buFont typeface="Arial" panose="020B0604020202020204" pitchFamily="34" charset="0"/>
+              <a:buChar char="•"/>
+            </a:pPr>
+            <a:r>
+              <a:rPr lang="he-IL" sz="1600" dirty="0"/>
+              <a:t>בחנות ניתן לקנות אביזרים שיעזרו לעבור את השלב הבא , והמחיר שלהם נבחר לפי הסכום שהשחקן הצליח להשיג לעומת הסכום שיהיה עליו להשיג בשלב הבא</a:t>
+            </a:r>
+          </a:p>
+          <a:p>
+            <a:pPr lvl="2" indent="-228600">
+              <a:buFont typeface="Arial" panose="020B0604020202020204" pitchFamily="34" charset="0"/>
+              <a:buChar char="•"/>
+            </a:pPr>
+            <a:r>
+              <a:rPr lang="he-IL" sz="1600" dirty="0"/>
+              <a:t>חפרפרת – הסכום הכי נמוך במשחק , אך ישנה אפשרות של חפרפרת עם יהלום</a:t>
+            </a:r>
+          </a:p>
+          <a:p>
+            <a:pPr marL="685800" lvl="2"/>
+            <a:endParaRPr lang="he-IL" sz="1600" dirty="0"/>
+          </a:p>
+          <a:p>
+            <a:pPr marL="685800" lvl="2"/>
+            <a:r>
+              <a:rPr lang="he-IL" sz="1600" dirty="0"/>
+              <a:t>כל הדוגמאות המפורטות כאן משפיעות על החלטות במשחק , כיוון שעל השחקן להחליט מה הוא רוצה לאסוף לפני מה , ובנוסף איך הוא קונה בחנות ועדיין נשאר לו מספיק כסף בכדי לעבור את השלב הבא</a:t>
+            </a:r>
+          </a:p>
+          <a:p>
+            <a:pPr marL="685800" lvl="2"/>
+            <a:endParaRPr lang="he-IL" sz="1600" dirty="0"/>
           </a:p>
         </p:txBody>
       </p:sp>
@@ -5419,6 +6882,20 @@
               <a:rPr lang="he-IL" sz="2000" dirty="0"/>
               <a:t>בנוסף גם הגלגלת זזה מצב לצד באיטיות וכך מקשה על השחקן עוד יותר</a:t>
             </a:r>
+          </a:p>
+          <a:p>
+            <a:pPr indent="-228600" algn="r">
+              <a:buFont typeface="Arial" panose="020B0604020202020204" pitchFamily="34" charset="0"/>
+              <a:buChar char="•"/>
+            </a:pPr>
+            <a:r>
+              <a:rPr lang="he-IL" sz="2000" dirty="0"/>
+              <a:t>החפרפרות זזות מצד לצד ולא מתנגשות אחת </a:t>
+            </a:r>
+            <a:r>
+              <a:rPr lang="he-IL" sz="2000" dirty="0" err="1"/>
+              <a:t>בשניה</a:t>
+            </a:r>
             <a:endParaRPr lang="en-US" sz="2000" dirty="0"/>
           </a:p>
         </p:txBody>
@@ -5438,7 +6915,7 @@
           <p:nvPr/>
         </p:nvPicPr>
         <p:blipFill>
-          <a:blip r:embed="rId2">
+          <a:blip r:embed="rId3">
             <a:extLst>
               <a:ext uri="{28A0092B-C50C-407E-A947-70E740481C1C}">
                 <a14:useLocalDpi xmlns:a14="http://schemas.microsoft.com/office/drawing/2010/main" val="0"/>
@@ -5709,18 +7186,9 @@
               <a:buChar char="•"/>
             </a:pPr>
             <a:r>
-              <a:rPr lang="he-IL" sz="2000" dirty="0">
-                <a:highlight>
-                  <a:srgbClr val="FFFF00"/>
-                </a:highlight>
-              </a:rPr>
-              <a:t>הסחורה החנות מציעה נבחרת באקראית , וכמובן המחיר נקבע לפי </a:t>
-            </a:r>
-            <a:endParaRPr lang="en-US" sz="2000" dirty="0">
-              <a:highlight>
-                <a:srgbClr val="FFFF00"/>
-              </a:highlight>
-            </a:endParaRPr>
+              <a:rPr lang="he-IL" sz="2000" dirty="0"/>
+              <a:t>המחיר של הסחורה משתנה משלב ולשלב , הוא מוצע כך שאם הסכום שלך גבוה מאוד כך גם הסחורה תהיה יקרה וזאת בכדי לאזן את המשחק ולגרום לשחקן לאתגר בכל שלב</a:t>
+            </a:r>
           </a:p>
         </p:txBody>
       </p:sp>
@@ -5739,7 +7207,7 @@
           <p:nvPr/>
         </p:nvPicPr>
         <p:blipFill>
-          <a:blip r:embed="rId2">
+          <a:blip r:embed="rId3">
             <a:extLst>
               <a:ext uri="{28A0092B-C50C-407E-A947-70E740481C1C}">
                 <a14:useLocalDpi xmlns:a14="http://schemas.microsoft.com/office/drawing/2010/main" val="0"/>
@@ -5990,7 +7458,7 @@
           </a:bodyPr>
           <a:lstStyle/>
           <a:p>
-            <a:pPr indent="-228600" algn="r">
+            <a:pPr indent="-228600">
               <a:buFont typeface="Arial" panose="020B0604020202020204" pitchFamily="34" charset="0"/>
               <a:buChar char="•"/>
             </a:pPr>
@@ -6000,7 +7468,7 @@
             </a:r>
           </a:p>
           <a:p>
-            <a:pPr indent="-228600" algn="r">
+            <a:pPr indent="-228600">
               <a:buFont typeface="Arial" panose="020B0604020202020204" pitchFamily="34" charset="0"/>
               <a:buChar char="•"/>
             </a:pPr>
@@ -6010,36 +7478,55 @@
             </a:r>
           </a:p>
           <a:p>
-            <a:pPr algn="r"/>
+            <a:pPr marL="742950" lvl="1" indent="-285750">
+              <a:buFont typeface="Arial" panose="020B0604020202020204" pitchFamily="34" charset="0"/>
+              <a:buChar char="•"/>
+            </a:pPr>
+            <a:r>
+              <a:rPr lang="he-IL" sz="1600" dirty="0"/>
+              <a:t>איזה שלב הוא נמצא</a:t>
+            </a:r>
+          </a:p>
+          <a:p>
+            <a:pPr marL="742950" lvl="1" indent="-285750">
+              <a:buFont typeface="Arial" panose="020B0604020202020204" pitchFamily="34" charset="0"/>
+              <a:buChar char="•"/>
+            </a:pPr>
+            <a:r>
+              <a:rPr lang="he-IL" sz="1600" dirty="0"/>
+              <a:t>כמה זמן נותר לשלב</a:t>
+            </a:r>
+          </a:p>
+          <a:p>
+            <a:pPr marL="742950" lvl="1" indent="-285750">
+              <a:buFont typeface="Arial" panose="020B0604020202020204" pitchFamily="34" charset="0"/>
+              <a:buChar char="•"/>
+            </a:pPr>
+            <a:r>
+              <a:rPr lang="he-IL" sz="1600" dirty="0"/>
+              <a:t>מה סכום הכסף שצבר</a:t>
+            </a:r>
+          </a:p>
+          <a:p>
+            <a:pPr marL="742950" lvl="1" indent="-285750">
+              <a:buFont typeface="Arial" panose="020B0604020202020204" pitchFamily="34" charset="0"/>
+              <a:buChar char="•"/>
+            </a:pPr>
+            <a:r>
+              <a:rPr lang="he-IL" sz="1600" dirty="0"/>
+              <a:t>כמה כסף צריך לצבור בכדי לעבור את השלב</a:t>
+            </a:r>
+          </a:p>
+          <a:p>
+            <a:pPr indent="-228600">
+              <a:buFont typeface="Arial" panose="020B0604020202020204" pitchFamily="34" charset="0"/>
+              <a:buChar char="•"/>
+            </a:pPr>
             <a:r>
               <a:rPr lang="he-IL" sz="2400" dirty="0"/>
-              <a:t>	</a:t>
-            </a:r>
-            <a:r>
-              <a:rPr lang="he-IL" sz="1800" dirty="0"/>
-              <a:t>איזה שלב הוא נמצא</a:t>
-            </a:r>
-          </a:p>
-          <a:p>
-            <a:pPr algn="r"/>
-            <a:r>
-              <a:rPr lang="he-IL" sz="1800" dirty="0"/>
-              <a:t>	כמה זמן נותר לשלב</a:t>
-            </a:r>
-          </a:p>
-          <a:p>
-            <a:pPr algn="r"/>
-            <a:r>
-              <a:rPr lang="he-IL" sz="1800" dirty="0"/>
-              <a:t>	מה סכום הכסף שצבר</a:t>
-            </a:r>
-          </a:p>
-          <a:p>
-            <a:pPr algn="r"/>
-            <a:r>
-              <a:rPr lang="he-IL" sz="1800" dirty="0"/>
-              <a:t>	כמה כסף צריך לצבור בכדי לעבור את השלב</a:t>
-            </a:r>
+              <a:t>נקודת המבט במשחק זה היא צידית</a:t>
+            </a:r>
+            <a:endParaRPr lang="en-US" sz="2400" dirty="0"/>
           </a:p>
           <a:p>
             <a:pPr indent="-228600" algn="r">
@@ -6065,7 +7552,7 @@
           <p:nvPr/>
         </p:nvPicPr>
         <p:blipFill>
-          <a:blip r:embed="rId2">
+          <a:blip r:embed="rId3">
             <a:extLst>
               <a:ext uri="{28A0092B-C50C-407E-A947-70E740481C1C}">
                 <a14:useLocalDpi xmlns:a14="http://schemas.microsoft.com/office/drawing/2010/main" val="0"/>
@@ -6078,8 +7565,8 @@
         </p:blipFill>
         <p:spPr>
           <a:xfrm>
-            <a:off x="3566518" y="514965"/>
-            <a:ext cx="7223596" cy="1061908"/>
+            <a:off x="6917924" y="5053108"/>
+            <a:ext cx="4435876" cy="652098"/>
           </a:xfrm>
           <a:prstGeom prst="rect">
             <a:avLst/>
@@ -6108,6 +7595,17 @@
 <file path=ppt/slides/slide8.xml><?xml version="1.0" encoding="utf-8"?>
 <p:sld xmlns:a="http://schemas.openxmlformats.org/drawingml/2006/main" xmlns:r="http://schemas.openxmlformats.org/officeDocument/2006/relationships" xmlns:p="http://schemas.openxmlformats.org/presentationml/2006/main">
   <p:cSld>
+    <p:bg>
+      <p:bgPr>
+        <a:solidFill>
+          <a:schemeClr val="bg1">
+            <a:tint val="95000"/>
+            <a:satMod val="170000"/>
+          </a:schemeClr>
+        </a:solidFill>
+        <a:effectLst/>
+      </p:bgPr>
+    </p:bg>
     <p:spTree>
       <p:nvGrpSpPr>
         <p:cNvPr id="1" name=""/>
@@ -6124,62 +7622,273 @@
       </p:grpSpPr>
       <p:sp>
         <p:nvSpPr>
-          <p:cNvPr id="2" name="כותרת 1">
-            <a:extLst>
-              <a:ext uri="{FF2B5EF4-FFF2-40B4-BE49-F238E27FC236}">
-                <a16:creationId xmlns:a16="http://schemas.microsoft.com/office/drawing/2014/main" id="{17134110-476D-4358-A5AF-339885D19E05}"/>
-              </a:ext>
-            </a:extLst>
-          </p:cNvPr>
-          <p:cNvSpPr>
-            <a:spLocks noGrp="1"/>
-          </p:cNvSpPr>
-          <p:nvPr>
-            <p:ph type="title"/>
+          <p:cNvPr id="14" name="Freeform: Shape 13">
+            <a:extLst>
+              <a:ext uri="{FF2B5EF4-FFF2-40B4-BE49-F238E27FC236}">
+                <a16:creationId xmlns:a16="http://schemas.microsoft.com/office/drawing/2014/main" id="{48A740BC-A0AA-45E0-B899-2AE9C6FE11CA}"/>
+              </a:ext>
+              <a:ext uri="{C183D7F6-B498-43B3-948B-1728B52AA6E4}">
+                <adec:decorative xmlns:adec="http://schemas.microsoft.com/office/drawing/2017/decorative" val="1"/>
+              </a:ext>
+            </a:extLst>
+          </p:cNvPr>
+          <p:cNvSpPr>
+            <a:spLocks noGrp="1" noRot="1" noChangeAspect="1" noMove="1" noResize="1" noEditPoints="1" noAdjustHandles="1" noChangeArrowheads="1" noChangeShapeType="1" noTextEdit="1"/>
+          </p:cNvSpPr>
+          <p:nvPr>
+            <p:extLst>
+              <p:ext uri="{386F3935-93C4-4BCD-93E2-E3B085C9AB24}">
+                <p16:designElem xmlns:p16="http://schemas.microsoft.com/office/powerpoint/2015/main" val="1"/>
+              </p:ext>
+            </p:extLst>
           </p:nvPr>
         </p:nvSpPr>
         <p:spPr>
           <a:xfrm>
-            <a:off x="839788" y="457200"/>
-            <a:ext cx="3932237" cy="926983"/>
+            <a:off x="5913121" y="-2"/>
+            <a:ext cx="6278879" cy="6858002"/>
+          </a:xfrm>
+          <a:custGeom>
+            <a:avLst/>
+            <a:gdLst>
+              <a:gd name="connsiteX0" fmla="*/ 45572 w 6278879"/>
+              <a:gd name="connsiteY0" fmla="*/ 0 h 6858002"/>
+              <a:gd name="connsiteX1" fmla="*/ 6278879 w 6278879"/>
+              <a:gd name="connsiteY1" fmla="*/ 0 h 6858002"/>
+              <a:gd name="connsiteX2" fmla="*/ 6278879 w 6278879"/>
+              <a:gd name="connsiteY2" fmla="*/ 6858002 h 6858002"/>
+              <a:gd name="connsiteX3" fmla="*/ 3292308 w 6278879"/>
+              <a:gd name="connsiteY3" fmla="*/ 6858002 h 6858002"/>
+              <a:gd name="connsiteX4" fmla="*/ 3181526 w 6278879"/>
+              <a:gd name="connsiteY4" fmla="*/ 6786982 h 6858002"/>
+              <a:gd name="connsiteX5" fmla="*/ 0 w 6278879"/>
+              <a:gd name="connsiteY5" fmla="*/ 803254 h 6858002"/>
+              <a:gd name="connsiteX6" fmla="*/ 37255 w 6278879"/>
+              <a:gd name="connsiteY6" fmla="*/ 65447 h 6858002"/>
+            </a:gdLst>
+            <a:ahLst/>
+            <a:cxnLst>
+              <a:cxn ang="0">
+                <a:pos x="connsiteX0" y="connsiteY0"/>
+              </a:cxn>
+              <a:cxn ang="0">
+                <a:pos x="connsiteX1" y="connsiteY1"/>
+              </a:cxn>
+              <a:cxn ang="0">
+                <a:pos x="connsiteX2" y="connsiteY2"/>
+              </a:cxn>
+              <a:cxn ang="0">
+                <a:pos x="connsiteX3" y="connsiteY3"/>
+              </a:cxn>
+              <a:cxn ang="0">
+                <a:pos x="connsiteX4" y="connsiteY4"/>
+              </a:cxn>
+              <a:cxn ang="0">
+                <a:pos x="connsiteX5" y="connsiteY5"/>
+              </a:cxn>
+              <a:cxn ang="0">
+                <a:pos x="connsiteX6" y="connsiteY6"/>
+              </a:cxn>
+            </a:cxnLst>
+            <a:rect l="l" t="t" r="r" b="b"/>
+            <a:pathLst>
+              <a:path w="6278879" h="6858002">
+                <a:moveTo>
+                  <a:pt x="45572" y="0"/>
+                </a:moveTo>
+                <a:lnTo>
+                  <a:pt x="6278879" y="0"/>
+                </a:lnTo>
+                <a:lnTo>
+                  <a:pt x="6278879" y="6858002"/>
+                </a:lnTo>
+                <a:lnTo>
+                  <a:pt x="3292308" y="6858002"/>
+                </a:lnTo>
+                <a:lnTo>
+                  <a:pt x="3181526" y="6786982"/>
+                </a:lnTo>
+                <a:cubicBezTo>
+                  <a:pt x="1262021" y="5490191"/>
+                  <a:pt x="0" y="3294103"/>
+                  <a:pt x="0" y="803254"/>
+                </a:cubicBezTo>
+                <a:cubicBezTo>
+                  <a:pt x="0" y="554169"/>
+                  <a:pt x="12620" y="308032"/>
+                  <a:pt x="37255" y="65447"/>
+                </a:cubicBezTo>
+                <a:close/>
+              </a:path>
+            </a:pathLst>
+          </a:custGeom>
+          <a:solidFill>
+            <a:schemeClr val="bg1">
+              <a:lumMod val="85000"/>
+              <a:lumOff val="15000"/>
+              <a:alpha val="70000"/>
+            </a:schemeClr>
+          </a:solidFill>
+          <a:ln>
+            <a:noFill/>
+          </a:ln>
+        </p:spPr>
+        <p:style>
+          <a:lnRef idx="2">
+            <a:schemeClr val="accent1">
+              <a:shade val="50000"/>
+            </a:schemeClr>
+          </a:lnRef>
+          <a:fillRef idx="1">
+            <a:schemeClr val="accent1"/>
+          </a:fillRef>
+          <a:effectRef idx="0">
+            <a:schemeClr val="accent1"/>
+          </a:effectRef>
+          <a:fontRef idx="minor">
+            <a:schemeClr val="lt1"/>
+          </a:fontRef>
+        </p:style>
+        <p:txBody>
+          <a:bodyPr rtlCol="0" anchor="ctr"/>
+          <a:lstStyle/>
+          <a:p>
+            <a:pPr marL="0" marR="0" lvl="0" indent="0" algn="ctr" defTabSz="914400" rtl="0" eaLnBrk="1" fontAlgn="auto" latinLnBrk="0" hangingPunct="1">
+              <a:lnSpc>
+                <a:spcPct val="100000"/>
+              </a:lnSpc>
+              <a:spcBef>
+                <a:spcPts val="0"/>
+              </a:spcBef>
+              <a:spcAft>
+                <a:spcPts val="0"/>
+              </a:spcAft>
+              <a:buClrTx/>
+              <a:buSzTx/>
+              <a:buFontTx/>
+              <a:buNone/>
+              <a:tabLst/>
+              <a:defRPr/>
+            </a:pPr>
+            <a:endParaRPr kumimoji="0" lang="en-US" sz="1800" b="0" i="0" u="none" strike="noStrike" kern="1200" cap="none" spc="0" normalizeH="0" baseline="0" noProof="0">
+              <a:ln>
+                <a:noFill/>
+              </a:ln>
+              <a:solidFill>
+                <a:prstClr val="white"/>
+              </a:solidFill>
+              <a:effectLst/>
+              <a:uLnTx/>
+              <a:uFillTx/>
+              <a:latin typeface="Calibri" panose="020F0502020204030204"/>
+              <a:ea typeface="+mn-ea"/>
+              <a:cs typeface="+mn-cs"/>
+            </a:endParaRPr>
+          </a:p>
+        </p:txBody>
+      </p:sp>
+      <p:sp>
+        <p:nvSpPr>
+          <p:cNvPr id="2" name="כותרת 1">
+            <a:extLst>
+              <a:ext uri="{FF2B5EF4-FFF2-40B4-BE49-F238E27FC236}">
+                <a16:creationId xmlns:a16="http://schemas.microsoft.com/office/drawing/2014/main" id="{17134110-476D-4358-A5AF-339885D19E05}"/>
+              </a:ext>
+            </a:extLst>
+          </p:cNvPr>
+          <p:cNvSpPr>
+            <a:spLocks noGrp="1"/>
+          </p:cNvSpPr>
+          <p:nvPr>
+            <p:ph type="title"/>
+          </p:nvPr>
+        </p:nvSpPr>
+        <p:spPr>
+          <a:xfrm>
+            <a:off x="655320" y="365125"/>
+            <a:ext cx="9013052" cy="1623312"/>
           </a:xfrm>
         </p:spPr>
         <p:txBody>
-          <a:bodyPr/>
+          <a:bodyPr vert="horz" lIns="91440" tIns="45720" rIns="91440" bIns="45720" rtlCol="0" anchor="b">
+            <a:normAutofit/>
+          </a:bodyPr>
           <a:lstStyle/>
           <a:p>
-            <a:r>
-              <a:rPr lang="he-IL" dirty="0"/>
+            <a:pPr algn="l" rtl="0"/>
+            <a:r>
+              <a:rPr lang="en-US" sz="4000" kern="1200" dirty="0">
+                <a:solidFill>
+                  <a:schemeClr val="tx1"/>
+                </a:solidFill>
+                <a:latin typeface="+mj-lt"/>
+                <a:ea typeface="+mj-ea"/>
+                <a:cs typeface="+mj-cs"/>
+              </a:rPr>
               <a:t>שליטה</a:t>
             </a:r>
-            <a:endParaRPr lang="en-IL" dirty="0"/>
-          </a:p>
-        </p:txBody>
-      </p:sp>
-      <p:sp>
-        <p:nvSpPr>
-          <p:cNvPr id="3" name="מציין מיקום של תמונה 2">
-            <a:extLst>
-              <a:ext uri="{FF2B5EF4-FFF2-40B4-BE49-F238E27FC236}">
-                <a16:creationId xmlns:a16="http://schemas.microsoft.com/office/drawing/2014/main" id="{BE505DD2-AA9A-4DD6-BA62-A64238C8888B}"/>
-              </a:ext>
-            </a:extLst>
-          </p:cNvPr>
-          <p:cNvSpPr>
-            <a:spLocks noGrp="1"/>
-          </p:cNvSpPr>
-          <p:nvPr>
-            <p:ph type="pic" idx="1"/>
-          </p:nvPr>
-        </p:nvSpPr>
-        <p:spPr/>
-      </p:sp>
-      <p:sp>
-        <p:nvSpPr>
-          <p:cNvPr id="4" name="מציין מיקום טקסט 3">
-            <a:extLst>
-              <a:ext uri="{FF2B5EF4-FFF2-40B4-BE49-F238E27FC236}">
-                <a16:creationId xmlns:a16="http://schemas.microsoft.com/office/drawing/2014/main" id="{884B80EC-1B53-4EAE-871F-9D36ECE9013C}"/>
+          </a:p>
+        </p:txBody>
+      </p:sp>
+      <p:cxnSp>
+        <p:nvCxnSpPr>
+          <p:cNvPr id="16" name="Straight Arrow Connector 15">
+            <a:extLst>
+              <a:ext uri="{FF2B5EF4-FFF2-40B4-BE49-F238E27FC236}">
+                <a16:creationId xmlns:a16="http://schemas.microsoft.com/office/drawing/2014/main" id="{B874EF51-C858-4BB9-97C3-D17755787127}"/>
+              </a:ext>
+              <a:ext uri="{C183D7F6-B498-43B3-948B-1728B52AA6E4}">
+                <adec:decorative xmlns:adec="http://schemas.microsoft.com/office/drawing/2017/decorative" val="1"/>
+              </a:ext>
+            </a:extLst>
+          </p:cNvPr>
+          <p:cNvCxnSpPr>
+            <a:cxnSpLocks noGrp="1" noRot="1" noChangeAspect="1" noMove="1" noResize="1" noEditPoints="1" noAdjustHandles="1" noChangeArrowheads="1" noChangeShapeType="1"/>
+          </p:cNvCxnSpPr>
+          <p:nvPr>
+            <p:extLst>
+              <p:ext uri="{386F3935-93C4-4BCD-93E2-E3B085C9AB24}">
+                <p16:designElem xmlns:p16="http://schemas.microsoft.com/office/powerpoint/2015/main" val="1"/>
+              </p:ext>
+            </p:extLst>
+          </p:nvPr>
+        </p:nvCxnSpPr>
+        <p:spPr>
+          <a:xfrm>
+            <a:off x="763661" y="2316480"/>
+            <a:ext cx="8229600" cy="0"/>
+          </a:xfrm>
+          <a:prstGeom prst="straightConnector1">
+            <a:avLst/>
+          </a:prstGeom>
+          <a:ln w="19050" cap="sq">
+            <a:solidFill>
+              <a:schemeClr val="tx1"/>
+            </a:solidFill>
+            <a:tailEnd type="none"/>
+          </a:ln>
+        </p:spPr>
+        <p:style>
+          <a:lnRef idx="1">
+            <a:schemeClr val="accent1"/>
+          </a:lnRef>
+          <a:fillRef idx="0">
+            <a:schemeClr val="accent1"/>
+          </a:fillRef>
+          <a:effectRef idx="0">
+            <a:schemeClr val="accent1"/>
+          </a:effectRef>
+          <a:fontRef idx="minor">
+            <a:schemeClr val="tx1"/>
+          </a:fontRef>
+        </p:style>
+      </p:cxnSp>
+      <p:sp>
+        <p:nvSpPr>
+          <p:cNvPr id="9" name="מציין מיקום טקסט 8">
+            <a:extLst>
+              <a:ext uri="{FF2B5EF4-FFF2-40B4-BE49-F238E27FC236}">
+                <a16:creationId xmlns:a16="http://schemas.microsoft.com/office/drawing/2014/main" id="{28ADB59D-BC8E-4FEF-A5C3-AC437CF846EE}"/>
               </a:ext>
             </a:extLst>
           </p:cNvPr>
@@ -6190,15 +7899,186 @@
             <p:ph type="body" sz="half" idx="2"/>
           </p:nvPr>
         </p:nvSpPr>
-        <p:spPr/>
-        <p:txBody>
-          <a:bodyPr/>
+        <p:spPr>
+          <a:xfrm>
+            <a:off x="3076153" y="2759593"/>
+            <a:ext cx="9013052" cy="3327251"/>
+          </a:xfrm>
+        </p:spPr>
+        <p:txBody>
+          <a:bodyPr vert="horz" lIns="91440" tIns="45720" rIns="91440" bIns="45720" rtlCol="0">
+            <a:normAutofit/>
+          </a:bodyPr>
           <a:lstStyle/>
           <a:p>
-            <a:endParaRPr lang="en-IL"/>
-          </a:p>
-        </p:txBody>
-      </p:sp>
+            <a:pPr algn="r"/>
+            <a:r>
+              <a:rPr lang="he-IL" sz="2000" dirty="0"/>
+              <a:t>במשחק זה כל השליטה היא ישירה , ומתנהלת בזמן אמת</a:t>
+            </a:r>
+          </a:p>
+          <a:p>
+            <a:pPr indent="-228600" algn="r">
+              <a:buFont typeface="Arial" panose="020B0604020202020204" pitchFamily="34" charset="0"/>
+              <a:buChar char="•"/>
+            </a:pPr>
+            <a:r>
+              <a:rPr lang="he-IL" sz="2000" dirty="0"/>
+              <a:t>בכדי להוריד את הגלגלת נשתמש בכפתור למטה</a:t>
+            </a:r>
+          </a:p>
+          <a:p>
+            <a:pPr indent="-228600" algn="r">
+              <a:buFont typeface="Arial" panose="020B0604020202020204" pitchFamily="34" charset="0"/>
+              <a:buChar char="•"/>
+            </a:pPr>
+            <a:r>
+              <a:rPr lang="he-IL" sz="2000" dirty="0"/>
+              <a:t>בכדי לפוצץ דינמיט נשתמש בכפתור למעלה </a:t>
+            </a:r>
+          </a:p>
+          <a:p>
+            <a:pPr indent="-228600" algn="r">
+              <a:buFont typeface="Arial" panose="020B0604020202020204" pitchFamily="34" charset="0"/>
+              <a:buChar char="•"/>
+            </a:pPr>
+            <a:r>
+              <a:rPr lang="he-IL" sz="2000" dirty="0"/>
+              <a:t>בכדי לקנות בחנות נשתמש בעכבר לבחירת הסחורה</a:t>
+            </a:r>
+          </a:p>
+          <a:p>
+            <a:pPr indent="-228600" algn="r">
+              <a:buFont typeface="Arial" panose="020B0604020202020204" pitchFamily="34" charset="0"/>
+              <a:buChar char="•"/>
+            </a:pPr>
+            <a:endParaRPr lang="en-US" sz="2000" dirty="0"/>
+          </a:p>
+        </p:txBody>
+      </p:sp>
+      <p:pic>
+        <p:nvPicPr>
+          <p:cNvPr id="12" name="תמונה 11" descr="תמונה שמכילה שעון, מחשב, אור&#10;&#10;התיאור נוצר באופן אוטומטי">
+            <a:extLst>
+              <a:ext uri="{FF2B5EF4-FFF2-40B4-BE49-F238E27FC236}">
+                <a16:creationId xmlns:a16="http://schemas.microsoft.com/office/drawing/2014/main" id="{FF79EBA7-6068-47E4-986A-EC359C50588A}"/>
+              </a:ext>
+            </a:extLst>
+          </p:cNvPr>
+          <p:cNvPicPr>
+            <a:picLocks noChangeAspect="1"/>
+          </p:cNvPicPr>
+          <p:nvPr/>
+        </p:nvPicPr>
+        <p:blipFill rotWithShape="1">
+          <a:blip r:embed="rId3">
+            <a:extLst>
+              <a:ext uri="{28A0092B-C50C-407E-A947-70E740481C1C}">
+                <a14:useLocalDpi xmlns:a14="http://schemas.microsoft.com/office/drawing/2010/main" val="0"/>
+              </a:ext>
+            </a:extLst>
+          </a:blip>
+          <a:srcRect l="18852" t="68787" r="48161" b="2169"/>
+          <a:stretch/>
+        </p:blipFill>
+        <p:spPr>
+          <a:xfrm>
+            <a:off x="815338" y="2644524"/>
+            <a:ext cx="2690038" cy="1197906"/>
+          </a:xfrm>
+          <a:prstGeom prst="rect">
+            <a:avLst/>
+          </a:prstGeom>
+          <a:ln>
+            <a:noFill/>
+          </a:ln>
+          <a:effectLst>
+            <a:softEdge rad="112500"/>
+          </a:effectLst>
+        </p:spPr>
+      </p:pic>
+      <p:pic>
+        <p:nvPicPr>
+          <p:cNvPr id="13" name="תמונה 12" descr="תמונה שמכילה שעון, מחשב, אור&#10;&#10;התיאור נוצר באופן אוטומטי">
+            <a:extLst>
+              <a:ext uri="{FF2B5EF4-FFF2-40B4-BE49-F238E27FC236}">
+                <a16:creationId xmlns:a16="http://schemas.microsoft.com/office/drawing/2014/main" id="{2B97FF14-BA5E-495E-87BC-D24D8DEC6C84}"/>
+              </a:ext>
+            </a:extLst>
+          </p:cNvPr>
+          <p:cNvPicPr>
+            <a:picLocks noChangeAspect="1"/>
+          </p:cNvPicPr>
+          <p:nvPr/>
+        </p:nvPicPr>
+        <p:blipFill rotWithShape="1">
+          <a:blip r:embed="rId3">
+            <a:extLst>
+              <a:ext uri="{28A0092B-C50C-407E-A947-70E740481C1C}">
+                <a14:useLocalDpi xmlns:a14="http://schemas.microsoft.com/office/drawing/2010/main" val="0"/>
+              </a:ext>
+            </a:extLst>
+          </a:blip>
+          <a:srcRect l="24757" t="80439" r="69702" b="8351"/>
+          <a:stretch/>
+        </p:blipFill>
+        <p:spPr>
+          <a:xfrm>
+            <a:off x="6540854" y="3087637"/>
+            <a:ext cx="475862" cy="486930"/>
+          </a:xfrm>
+          <a:prstGeom prst="rect">
+            <a:avLst/>
+          </a:prstGeom>
+          <a:ln>
+            <a:noFill/>
+          </a:ln>
+          <a:effectLst>
+            <a:softEdge rad="112500"/>
+          </a:effectLst>
+        </p:spPr>
+      </p:pic>
+      <p:pic>
+        <p:nvPicPr>
+          <p:cNvPr id="15" name="תמונה 14" descr="תמונה שמכילה שעון, מחשב, אור&#10;&#10;התיאור נוצר באופן אוטומטי">
+            <a:extLst>
+              <a:ext uri="{FF2B5EF4-FFF2-40B4-BE49-F238E27FC236}">
+                <a16:creationId xmlns:a16="http://schemas.microsoft.com/office/drawing/2014/main" id="{AEE7CC02-352C-4994-B2DC-1BE6F5C23423}"/>
+              </a:ext>
+            </a:extLst>
+          </p:cNvPr>
+          <p:cNvPicPr>
+            <a:picLocks noChangeAspect="1"/>
+          </p:cNvPicPr>
+          <p:nvPr/>
+        </p:nvPicPr>
+        <p:blipFill rotWithShape="1">
+          <a:blip r:embed="rId3">
+            <a:extLst>
+              <a:ext uri="{28A0092B-C50C-407E-A947-70E740481C1C}">
+                <a14:useLocalDpi xmlns:a14="http://schemas.microsoft.com/office/drawing/2010/main" val="0"/>
+              </a:ext>
+            </a:extLst>
+          </a:blip>
+          <a:srcRect l="24757" t="80439" r="69702" b="8351"/>
+          <a:stretch/>
+        </p:blipFill>
+        <p:spPr>
+          <a:xfrm rot="10800000">
+            <a:off x="7106817" y="3470986"/>
+            <a:ext cx="475862" cy="486930"/>
+          </a:xfrm>
+          <a:prstGeom prst="rect">
+            <a:avLst/>
+          </a:prstGeom>
+          <a:ln>
+            <a:noFill/>
+          </a:ln>
+          <a:effectLst>
+            <a:softEdge rad="112500"/>
+          </a:effectLst>
+        </p:spPr>
+      </p:pic>
     </p:spTree>
     <p:extLst>
       <p:ext uri="{BB962C8B-B14F-4D97-AF65-F5344CB8AC3E}">
@@ -6207,105 +8087,7 @@
     </p:extLst>
   </p:cSld>
   <p:clrMapOvr>
-    <a:masterClrMapping/>
-  </p:clrMapOvr>
-</p:sld>
-</file>
-
-<file path=ppt/slides/slide9.xml><?xml version="1.0" encoding="utf-8"?>
-<p:sld xmlns:a="http://schemas.openxmlformats.org/drawingml/2006/main" xmlns:r="http://schemas.openxmlformats.org/officeDocument/2006/relationships" xmlns:p="http://schemas.openxmlformats.org/presentationml/2006/main">
-  <p:cSld>
-    <p:spTree>
-      <p:nvGrpSpPr>
-        <p:cNvPr id="1" name=""/>
-        <p:cNvGrpSpPr/>
-        <p:nvPr/>
-      </p:nvGrpSpPr>
-      <p:grpSpPr>
-        <a:xfrm>
-          <a:off x="0" y="0"/>
-          <a:ext cx="0" cy="0"/>
-          <a:chOff x="0" y="0"/>
-          <a:chExt cx="0" cy="0"/>
-        </a:xfrm>
-      </p:grpSpPr>
-      <p:sp>
-        <p:nvSpPr>
-          <p:cNvPr id="2" name="כותרת 1">
-            <a:extLst>
-              <a:ext uri="{FF2B5EF4-FFF2-40B4-BE49-F238E27FC236}">
-                <a16:creationId xmlns:a16="http://schemas.microsoft.com/office/drawing/2014/main" id="{7EC89449-2F8D-4241-9AB6-50B5D4ED4C5E}"/>
-              </a:ext>
-            </a:extLst>
-          </p:cNvPr>
-          <p:cNvSpPr>
-            <a:spLocks noGrp="1"/>
-          </p:cNvSpPr>
-          <p:nvPr>
-            <p:ph type="title"/>
-          </p:nvPr>
-        </p:nvSpPr>
-        <p:spPr/>
-        <p:txBody>
-          <a:bodyPr/>
-          <a:lstStyle/>
-          <a:p>
-            <a:endParaRPr lang="en-IL"/>
-          </a:p>
-        </p:txBody>
-      </p:sp>
-      <p:sp>
-        <p:nvSpPr>
-          <p:cNvPr id="3" name="מציין מיקום של תמונה 2">
-            <a:extLst>
-              <a:ext uri="{FF2B5EF4-FFF2-40B4-BE49-F238E27FC236}">
-                <a16:creationId xmlns:a16="http://schemas.microsoft.com/office/drawing/2014/main" id="{1BEE5345-38D9-4E3B-B1F8-0BE0EE9511A5}"/>
-              </a:ext>
-            </a:extLst>
-          </p:cNvPr>
-          <p:cNvSpPr>
-            <a:spLocks noGrp="1"/>
-          </p:cNvSpPr>
-          <p:nvPr>
-            <p:ph type="pic" idx="1"/>
-          </p:nvPr>
-        </p:nvSpPr>
-        <p:spPr/>
-      </p:sp>
-      <p:sp>
-        <p:nvSpPr>
-          <p:cNvPr id="4" name="מציין מיקום טקסט 3">
-            <a:extLst>
-              <a:ext uri="{FF2B5EF4-FFF2-40B4-BE49-F238E27FC236}">
-                <a16:creationId xmlns:a16="http://schemas.microsoft.com/office/drawing/2014/main" id="{3ABD936C-0056-4590-A6B1-32AC2DE10008}"/>
-              </a:ext>
-            </a:extLst>
-          </p:cNvPr>
-          <p:cNvSpPr>
-            <a:spLocks noGrp="1"/>
-          </p:cNvSpPr>
-          <p:nvPr>
-            <p:ph type="body" sz="half" idx="2"/>
-          </p:nvPr>
-        </p:nvSpPr>
-        <p:spPr/>
-        <p:txBody>
-          <a:bodyPr/>
-          <a:lstStyle/>
-          <a:p>
-            <a:endParaRPr lang="en-IL"/>
-          </a:p>
-        </p:txBody>
-      </p:sp>
-    </p:spTree>
-    <p:extLst>
-      <p:ext uri="{BB962C8B-B14F-4D97-AF65-F5344CB8AC3E}">
-        <p14:creationId xmlns:p14="http://schemas.microsoft.com/office/powerpoint/2010/main" val="783133139"/>
-      </p:ext>
-    </p:extLst>
-  </p:cSld>
-  <p:clrMapOvr>
-    <a:masterClrMapping/>
+    <a:overrideClrMapping bg1="dk1" tx1="lt1" bg2="dk2" tx2="lt2" accent1="accent1" accent2="accent2" accent3="accent3" accent4="accent4" accent5="accent5" accent6="accent6" hlink="hlink" folHlink="folHlink"/>
   </p:clrMapOvr>
 </p:sld>
 </file>
@@ -6603,4 +8385,299 @@
     </a:ext>
   </a:extLst>
 </a:theme>
+</file>
+
+<file path=ppt/theme/theme2.xml><?xml version="1.0" encoding="utf-8"?>
+<a:theme xmlns:a="http://schemas.openxmlformats.org/drawingml/2006/main" name="ערכת נושא Office">
+  <a:themeElements>
+    <a:clrScheme name="Office">
+      <a:dk1>
+        <a:sysClr val="windowText" lastClr="000000"/>
+      </a:dk1>
+      <a:lt1>
+        <a:sysClr val="window" lastClr="FFFFFF"/>
+      </a:lt1>
+      <a:dk2>
+        <a:srgbClr val="44546A"/>
+      </a:dk2>
+      <a:lt2>
+        <a:srgbClr val="E7E6E6"/>
+      </a:lt2>
+      <a:accent1>
+        <a:srgbClr val="4472C4"/>
+      </a:accent1>
+      <a:accent2>
+        <a:srgbClr val="ED7D31"/>
+      </a:accent2>
+      <a:accent3>
+        <a:srgbClr val="A5A5A5"/>
+      </a:accent3>
+      <a:accent4>
+        <a:srgbClr val="FFC000"/>
+      </a:accent4>
+      <a:accent5>
+        <a:srgbClr val="5B9BD5"/>
+      </a:accent5>
+      <a:accent6>
+        <a:srgbClr val="70AD47"/>
+      </a:accent6>
+      <a:hlink>
+        <a:srgbClr val="0563C1"/>
+      </a:hlink>
+      <a:folHlink>
+        <a:srgbClr val="954F72"/>
+      </a:folHlink>
+    </a:clrScheme>
+    <a:fontScheme name="Office">
+      <a:majorFont>
+        <a:latin typeface="Calibri Light" panose="020F0302020204030204"/>
+        <a:ea typeface=""/>
+        <a:cs typeface=""/>
+        <a:font script="Jpan" typeface="游ゴシック Light"/>
+        <a:font script="Hang" typeface="맑은 고딕"/>
+        <a:font script="Hans" typeface="等线 Light"/>
+        <a:font script="Hant" typeface="新細明體"/>
+        <a:font script="Arab" typeface="Times New Roman"/>
+        <a:font script="Hebr" typeface="Times New Roman"/>
+        <a:font script="Thai" typeface="Angsana New"/>
+        <a:font script="Ethi" typeface="Nyala"/>
+        <a:font script="Beng" typeface="Vrinda"/>
+        <a:font script="Gujr" typeface="Shruti"/>
+        <a:font script="Khmr" typeface="MoolBoran"/>
+        <a:font script="Knda" typeface="Tunga"/>
+        <a:font script="Guru" typeface="Raavi"/>
+        <a:font script="Cans" typeface="Euphemia"/>
+        <a:font script="Cher" typeface="Plantagenet Cherokee"/>
+        <a:font script="Yiii" typeface="Microsoft Yi Baiti"/>
+        <a:font script="Tibt" typeface="Microsoft Himalaya"/>
+        <a:font script="Thaa" typeface="MV Boli"/>
+        <a:font script="Deva" typeface="Mangal"/>
+        <a:font script="Telu" typeface="Gautami"/>
+        <a:font script="Taml" typeface="Latha"/>
+        <a:font script="Syrc" typeface="Estrangelo Edessa"/>
+        <a:font script="Orya" typeface="Kalinga"/>
+        <a:font script="Mlym" typeface="Kartika"/>
+        <a:font script="Laoo" typeface="DokChampa"/>
+        <a:font script="Sinh" typeface="Iskoola Pota"/>
+        <a:font script="Mong" typeface="Mongolian Baiti"/>
+        <a:font script="Viet" typeface="Times New Roman"/>
+        <a:font script="Uigh" typeface="Microsoft Uighur"/>
+        <a:font script="Geor" typeface="Sylfaen"/>
+        <a:font script="Armn" typeface="Arial"/>
+        <a:font script="Bugi" typeface="Leelawadee UI"/>
+        <a:font script="Bopo" typeface="Microsoft JhengHei"/>
+        <a:font script="Java" typeface="Javanese Text"/>
+        <a:font script="Lisu" typeface="Segoe UI"/>
+        <a:font script="Mymr" typeface="Myanmar Text"/>
+        <a:font script="Nkoo" typeface="Ebrima"/>
+        <a:font script="Olck" typeface="Nirmala UI"/>
+        <a:font script="Osma" typeface="Ebrima"/>
+        <a:font script="Phag" typeface="Phagspa"/>
+        <a:font script="Syrn" typeface="Estrangelo Edessa"/>
+        <a:font script="Syrj" typeface="Estrangelo Edessa"/>
+        <a:font script="Syre" typeface="Estrangelo Edessa"/>
+        <a:font script="Sora" typeface="Nirmala UI"/>
+        <a:font script="Tale" typeface="Microsoft Tai Le"/>
+        <a:font script="Talu" typeface="Microsoft New Tai Lue"/>
+        <a:font script="Tfng" typeface="Ebrima"/>
+      </a:majorFont>
+      <a:minorFont>
+        <a:latin typeface="Calibri" panose="020F0502020204030204"/>
+        <a:ea typeface=""/>
+        <a:cs typeface=""/>
+        <a:font script="Jpan" typeface="游ゴシック"/>
+        <a:font script="Hang" typeface="맑은 고딕"/>
+        <a:font script="Hans" typeface="等线"/>
+        <a:font script="Hant" typeface="新細明體"/>
+        <a:font script="Arab" typeface="Arial"/>
+        <a:font script="Hebr" typeface="Arial"/>
+        <a:font script="Thai" typeface="Cordia New"/>
+        <a:font script="Ethi" typeface="Nyala"/>
+        <a:font script="Beng" typeface="Vrinda"/>
+        <a:font script="Gujr" typeface="Shruti"/>
+        <a:font script="Khmr" typeface="DaunPenh"/>
+        <a:font script="Knda" typeface="Tunga"/>
+        <a:font script="Guru" typeface="Raavi"/>
+        <a:font script="Cans" typeface="Euphemia"/>
+        <a:font script="Cher" typeface="Plantagenet Cherokee"/>
+        <a:font script="Yiii" typeface="Microsoft Yi Baiti"/>
+        <a:font script="Tibt" typeface="Microsoft Himalaya"/>
+        <a:font script="Thaa" typeface="MV Boli"/>
+        <a:font script="Deva" typeface="Mangal"/>
+        <a:font script="Telu" typeface="Gautami"/>
+        <a:font script="Taml" typeface="Latha"/>
+        <a:font script="Syrc" typeface="Estrangelo Edessa"/>
+        <a:font script="Orya" typeface="Kalinga"/>
+        <a:font script="Mlym" typeface="Kartika"/>
+        <a:font script="Laoo" typeface="DokChampa"/>
+        <a:font script="Sinh" typeface="Iskoola Pota"/>
+        <a:font script="Mong" typeface="Mongolian Baiti"/>
+        <a:font script="Viet" typeface="Arial"/>
+        <a:font script="Uigh" typeface="Microsoft Uighur"/>
+        <a:font script="Geor" typeface="Sylfaen"/>
+        <a:font script="Armn" typeface="Arial"/>
+        <a:font script="Bugi" typeface="Leelawadee UI"/>
+        <a:font script="Bopo" typeface="Microsoft JhengHei"/>
+        <a:font script="Java" typeface="Javanese Text"/>
+        <a:font script="Lisu" typeface="Segoe UI"/>
+        <a:font script="Mymr" typeface="Myanmar Text"/>
+        <a:font script="Nkoo" typeface="Ebrima"/>
+        <a:font script="Olck" typeface="Nirmala UI"/>
+        <a:font script="Osma" typeface="Ebrima"/>
+        <a:font script="Phag" typeface="Phagspa"/>
+        <a:font script="Syrn" typeface="Estrangelo Edessa"/>
+        <a:font script="Syrj" typeface="Estrangelo Edessa"/>
+        <a:font script="Syre" typeface="Estrangelo Edessa"/>
+        <a:font script="Sora" typeface="Nirmala UI"/>
+        <a:font script="Tale" typeface="Microsoft Tai Le"/>
+        <a:font script="Talu" typeface="Microsoft New Tai Lue"/>
+        <a:font script="Tfng" typeface="Ebrima"/>
+      </a:minorFont>
+    </a:fontScheme>
+    <a:fmtScheme name="Office">
+      <a:fillStyleLst>
+        <a:solidFill>
+          <a:schemeClr val="phClr"/>
+        </a:solidFill>
+        <a:gradFill rotWithShape="1">
+          <a:gsLst>
+            <a:gs pos="0">
+              <a:schemeClr val="phClr">
+                <a:lumMod val="110000"/>
+                <a:satMod val="105000"/>
+                <a:tint val="67000"/>
+              </a:schemeClr>
+            </a:gs>
+            <a:gs pos="50000">
+              <a:schemeClr val="phClr">
+                <a:lumMod val="105000"/>
+                <a:satMod val="103000"/>
+                <a:tint val="73000"/>
+              </a:schemeClr>
+            </a:gs>
+            <a:gs pos="100000">
+              <a:schemeClr val="phClr">
+                <a:lumMod val="105000"/>
+                <a:satMod val="109000"/>
+                <a:tint val="81000"/>
+              </a:schemeClr>
+            </a:gs>
+          </a:gsLst>
+          <a:lin ang="5400000" scaled="0"/>
+        </a:gradFill>
+        <a:gradFill rotWithShape="1">
+          <a:gsLst>
+            <a:gs pos="0">
+              <a:schemeClr val="phClr">
+                <a:satMod val="103000"/>
+                <a:lumMod val="102000"/>
+                <a:tint val="94000"/>
+              </a:schemeClr>
+            </a:gs>
+            <a:gs pos="50000">
+              <a:schemeClr val="phClr">
+                <a:satMod val="110000"/>
+                <a:lumMod val="100000"/>
+                <a:shade val="100000"/>
+              </a:schemeClr>
+            </a:gs>
+            <a:gs pos="100000">
+              <a:schemeClr val="phClr">
+                <a:lumMod val="99000"/>
+                <a:satMod val="120000"/>
+                <a:shade val="78000"/>
+              </a:schemeClr>
+            </a:gs>
+          </a:gsLst>
+          <a:lin ang="5400000" scaled="0"/>
+        </a:gradFill>
+      </a:fillStyleLst>
+      <a:lnStyleLst>
+        <a:ln w="6350" cap="flat" cmpd="sng" algn="ctr">
+          <a:solidFill>
+            <a:schemeClr val="phClr"/>
+          </a:solidFill>
+          <a:prstDash val="solid"/>
+          <a:miter lim="800000"/>
+        </a:ln>
+        <a:ln w="12700" cap="flat" cmpd="sng" algn="ctr">
+          <a:solidFill>
+            <a:schemeClr val="phClr"/>
+          </a:solidFill>
+          <a:prstDash val="solid"/>
+          <a:miter lim="800000"/>
+        </a:ln>
+        <a:ln w="19050" cap="flat" cmpd="sng" algn="ctr">
+          <a:solidFill>
+            <a:schemeClr val="phClr"/>
+          </a:solidFill>
+          <a:prstDash val="solid"/>
+          <a:miter lim="800000"/>
+        </a:ln>
+      </a:lnStyleLst>
+      <a:effectStyleLst>
+        <a:effectStyle>
+          <a:effectLst/>
+        </a:effectStyle>
+        <a:effectStyle>
+          <a:effectLst/>
+        </a:effectStyle>
+        <a:effectStyle>
+          <a:effectLst>
+            <a:outerShdw blurRad="57150" dist="19050" dir="5400000" algn="ctr" rotWithShape="0">
+              <a:srgbClr val="000000">
+                <a:alpha val="63000"/>
+              </a:srgbClr>
+            </a:outerShdw>
+          </a:effectLst>
+        </a:effectStyle>
+      </a:effectStyleLst>
+      <a:bgFillStyleLst>
+        <a:solidFill>
+          <a:schemeClr val="phClr"/>
+        </a:solidFill>
+        <a:solidFill>
+          <a:schemeClr val="phClr">
+            <a:tint val="95000"/>
+            <a:satMod val="170000"/>
+          </a:schemeClr>
+        </a:solidFill>
+        <a:gradFill rotWithShape="1">
+          <a:gsLst>
+            <a:gs pos="0">
+              <a:schemeClr val="phClr">
+                <a:tint val="93000"/>
+                <a:satMod val="150000"/>
+                <a:shade val="98000"/>
+                <a:lumMod val="102000"/>
+              </a:schemeClr>
+            </a:gs>
+            <a:gs pos="50000">
+              <a:schemeClr val="phClr">
+                <a:tint val="98000"/>
+                <a:satMod val="130000"/>
+                <a:shade val="90000"/>
+                <a:lumMod val="103000"/>
+              </a:schemeClr>
+            </a:gs>
+            <a:gs pos="100000">
+              <a:schemeClr val="phClr">
+                <a:shade val="63000"/>
+                <a:satMod val="120000"/>
+              </a:schemeClr>
+            </a:gs>
+          </a:gsLst>
+          <a:lin ang="5400000" scaled="0"/>
+        </a:gradFill>
+      </a:bgFillStyleLst>
+    </a:fmtScheme>
+  </a:themeElements>
+  <a:objectDefaults/>
+  <a:extraClrSchemeLst/>
+  <a:extLst>
+    <a:ext uri="{05A4C25C-085E-4340-85A3-A5531E510DB2}">
+      <thm15:themeFamily xmlns:thm15="http://schemas.microsoft.com/office/thememl/2012/main" name="Office Theme" id="{62F939B6-93AF-4DB8-9C6B-D6C7DFDC589F}" vid="{4A3C46E8-61CC-4603-A589-7422A47A8E4A}"/>
+    </a:ext>
+  </a:extLst>
+</a:theme>
 </file>
</xml_diff>